<commit_message>
Add initial cache partition section
Also made minor changes in other sections of the paper, and added the
script used to max performance on the TX2.
</commit_message>
<xml_diff>
--- a/paper/figs/cache-mapping.pptx
+++ b/paper/figs/cache-mapping.pptx
@@ -2,18 +2,18 @@
 <file path=ppt/presentation.xml><?xml version="1.0" encoding="utf-8"?>
 <p:presentation xmlns:a="http://schemas.openxmlformats.org/drawingml/2006/main" xmlns:r="http://schemas.openxmlformats.org/officeDocument/2006/relationships" xmlns:p="http://schemas.openxmlformats.org/presentationml/2006/main" saveSubsetFonts="1">
   <p:sldMasterIdLst>
-    <p:sldMasterId id="2147483648" r:id="rId1"/>
+    <p:sldMasterId id="2147483696" r:id="rId1"/>
   </p:sldMasterIdLst>
   <p:sldIdLst>
     <p:sldId id="256" r:id="rId2"/>
   </p:sldIdLst>
-  <p:sldSz cx="12192000" cy="6858000"/>
+  <p:sldSz cx="6858000" cy="1828800"/>
   <p:notesSz cx="6858000" cy="9144000"/>
   <p:defaultTextStyle>
     <a:defPPr>
       <a:defRPr lang="en-US"/>
     </a:defPPr>
-    <a:lvl1pPr marL="0" algn="l" defTabSz="914400" rtl="0" eaLnBrk="1" latinLnBrk="0" hangingPunct="1">
+    <a:lvl1pPr marL="0" algn="l" defTabSz="457200" rtl="0" eaLnBrk="1" latinLnBrk="0" hangingPunct="1">
       <a:defRPr sz="1800" kern="1200">
         <a:solidFill>
           <a:schemeClr val="tx1"/>
@@ -23,7 +23,7 @@
         <a:cs typeface="+mn-cs"/>
       </a:defRPr>
     </a:lvl1pPr>
-    <a:lvl2pPr marL="457200" algn="l" defTabSz="914400" rtl="0" eaLnBrk="1" latinLnBrk="0" hangingPunct="1">
+    <a:lvl2pPr marL="457200" algn="l" defTabSz="457200" rtl="0" eaLnBrk="1" latinLnBrk="0" hangingPunct="1">
       <a:defRPr sz="1800" kern="1200">
         <a:solidFill>
           <a:schemeClr val="tx1"/>
@@ -33,7 +33,7 @@
         <a:cs typeface="+mn-cs"/>
       </a:defRPr>
     </a:lvl2pPr>
-    <a:lvl3pPr marL="914400" algn="l" defTabSz="914400" rtl="0" eaLnBrk="1" latinLnBrk="0" hangingPunct="1">
+    <a:lvl3pPr marL="914400" algn="l" defTabSz="457200" rtl="0" eaLnBrk="1" latinLnBrk="0" hangingPunct="1">
       <a:defRPr sz="1800" kern="1200">
         <a:solidFill>
           <a:schemeClr val="tx1"/>
@@ -43,7 +43,7 @@
         <a:cs typeface="+mn-cs"/>
       </a:defRPr>
     </a:lvl3pPr>
-    <a:lvl4pPr marL="1371600" algn="l" defTabSz="914400" rtl="0" eaLnBrk="1" latinLnBrk="0" hangingPunct="1">
+    <a:lvl4pPr marL="1371600" algn="l" defTabSz="457200" rtl="0" eaLnBrk="1" latinLnBrk="0" hangingPunct="1">
       <a:defRPr sz="1800" kern="1200">
         <a:solidFill>
           <a:schemeClr val="tx1"/>
@@ -53,7 +53,7 @@
         <a:cs typeface="+mn-cs"/>
       </a:defRPr>
     </a:lvl4pPr>
-    <a:lvl5pPr marL="1828800" algn="l" defTabSz="914400" rtl="0" eaLnBrk="1" latinLnBrk="0" hangingPunct="1">
+    <a:lvl5pPr marL="1828800" algn="l" defTabSz="457200" rtl="0" eaLnBrk="1" latinLnBrk="0" hangingPunct="1">
       <a:defRPr sz="1800" kern="1200">
         <a:solidFill>
           <a:schemeClr val="tx1"/>
@@ -63,7 +63,7 @@
         <a:cs typeface="+mn-cs"/>
       </a:defRPr>
     </a:lvl5pPr>
-    <a:lvl6pPr marL="2286000" algn="l" defTabSz="914400" rtl="0" eaLnBrk="1" latinLnBrk="0" hangingPunct="1">
+    <a:lvl6pPr marL="2286000" algn="l" defTabSz="457200" rtl="0" eaLnBrk="1" latinLnBrk="0" hangingPunct="1">
       <a:defRPr sz="1800" kern="1200">
         <a:solidFill>
           <a:schemeClr val="tx1"/>
@@ -73,7 +73,7 @@
         <a:cs typeface="+mn-cs"/>
       </a:defRPr>
     </a:lvl6pPr>
-    <a:lvl7pPr marL="2743200" algn="l" defTabSz="914400" rtl="0" eaLnBrk="1" latinLnBrk="0" hangingPunct="1">
+    <a:lvl7pPr marL="2743200" algn="l" defTabSz="457200" rtl="0" eaLnBrk="1" latinLnBrk="0" hangingPunct="1">
       <a:defRPr sz="1800" kern="1200">
         <a:solidFill>
           <a:schemeClr val="tx1"/>
@@ -83,7 +83,7 @@
         <a:cs typeface="+mn-cs"/>
       </a:defRPr>
     </a:lvl7pPr>
-    <a:lvl8pPr marL="3200400" algn="l" defTabSz="914400" rtl="0" eaLnBrk="1" latinLnBrk="0" hangingPunct="1">
+    <a:lvl8pPr marL="3200400" algn="l" defTabSz="457200" rtl="0" eaLnBrk="1" latinLnBrk="0" hangingPunct="1">
       <a:defRPr sz="1800" kern="1200">
         <a:solidFill>
           <a:schemeClr val="tx1"/>
@@ -93,7 +93,7 @@
         <a:cs typeface="+mn-cs"/>
       </a:defRPr>
     </a:lvl8pPr>
-    <a:lvl9pPr marL="3657600" algn="l" defTabSz="914400" rtl="0" eaLnBrk="1" latinLnBrk="0" hangingPunct="1">
+    <a:lvl9pPr marL="3657600" algn="l" defTabSz="457200" rtl="0" eaLnBrk="1" latinLnBrk="0" hangingPunct="1">
       <a:defRPr sz="1800" kern="1200">
         <a:solidFill>
           <a:schemeClr val="tx1"/>
@@ -104,6 +104,11 @@
       </a:defRPr>
     </a:lvl9pPr>
   </p:defaultTextStyle>
+  <p:extLst>
+    <p:ext uri="{EFAFB233-063F-42B5-8137-9DF3F51BA10A}">
+      <p15:sldGuideLst xmlns:p15="http://schemas.microsoft.com/office/powerpoint/2012/main"/>
+    </p:ext>
+  </p:extLst>
 </p:presentation>
 </file>
 
@@ -136,15 +141,15 @@
         </p:nvSpPr>
         <p:spPr>
           <a:xfrm>
-            <a:off x="1524000" y="1122363"/>
-            <a:ext cx="9144000" cy="2387600"/>
+            <a:off x="857250" y="299297"/>
+            <a:ext cx="5143500" cy="636693"/>
           </a:xfrm>
         </p:spPr>
         <p:txBody>
           <a:bodyPr anchor="b"/>
           <a:lstStyle>
             <a:lvl1pPr algn="ctr">
-              <a:defRPr sz="6000"/>
+              <a:defRPr sz="1600"/>
             </a:lvl1pPr>
           </a:lstStyle>
           <a:p>
@@ -152,7 +157,7 @@
               <a:rPr lang="en-US"/>
               <a:t>Click to edit Master title style</a:t>
             </a:r>
-            <a:endParaRPr lang="en-US"/>
+            <a:endParaRPr lang="en-US" dirty="0"/>
           </a:p>
         </p:txBody>
       </p:sp>
@@ -168,8 +173,8 @@
         </p:nvSpPr>
         <p:spPr>
           <a:xfrm>
-            <a:off x="1524000" y="3602038"/>
-            <a:ext cx="9144000" cy="1655762"/>
+            <a:off x="857250" y="960543"/>
+            <a:ext cx="5143500" cy="441537"/>
           </a:xfrm>
         </p:spPr>
         <p:txBody>
@@ -177,39 +182,39 @@
           <a:lstStyle>
             <a:lvl1pPr marL="0" indent="0" algn="ctr">
               <a:buNone/>
-              <a:defRPr sz="2400"/>
+              <a:defRPr sz="640"/>
             </a:lvl1pPr>
-            <a:lvl2pPr marL="457200" indent="0" algn="ctr">
-              <a:buNone/>
-              <a:defRPr sz="2000"/>
+            <a:lvl2pPr marL="121935" indent="0" algn="ctr">
+              <a:buNone/>
+              <a:defRPr sz="533"/>
             </a:lvl2pPr>
-            <a:lvl3pPr marL="914400" indent="0" algn="ctr">
-              <a:buNone/>
-              <a:defRPr sz="1800"/>
+            <a:lvl3pPr marL="243870" indent="0" algn="ctr">
+              <a:buNone/>
+              <a:defRPr sz="480"/>
             </a:lvl3pPr>
-            <a:lvl4pPr marL="1371600" indent="0" algn="ctr">
-              <a:buNone/>
-              <a:defRPr sz="1600"/>
+            <a:lvl4pPr marL="365806" indent="0" algn="ctr">
+              <a:buNone/>
+              <a:defRPr sz="427"/>
             </a:lvl4pPr>
-            <a:lvl5pPr marL="1828800" indent="0" algn="ctr">
-              <a:buNone/>
-              <a:defRPr sz="1600"/>
+            <a:lvl5pPr marL="487741" indent="0" algn="ctr">
+              <a:buNone/>
+              <a:defRPr sz="427"/>
             </a:lvl5pPr>
-            <a:lvl6pPr marL="2286000" indent="0" algn="ctr">
-              <a:buNone/>
-              <a:defRPr sz="1600"/>
+            <a:lvl6pPr marL="609676" indent="0" algn="ctr">
+              <a:buNone/>
+              <a:defRPr sz="427"/>
             </a:lvl6pPr>
-            <a:lvl7pPr marL="2743200" indent="0" algn="ctr">
-              <a:buNone/>
-              <a:defRPr sz="1600"/>
+            <a:lvl7pPr marL="731611" indent="0" algn="ctr">
+              <a:buNone/>
+              <a:defRPr sz="427"/>
             </a:lvl7pPr>
-            <a:lvl8pPr marL="3200400" indent="0" algn="ctr">
-              <a:buNone/>
-              <a:defRPr sz="1600"/>
+            <a:lvl8pPr marL="853547" indent="0" algn="ctr">
+              <a:buNone/>
+              <a:defRPr sz="427"/>
             </a:lvl8pPr>
-            <a:lvl9pPr marL="3657600" indent="0" algn="ctr">
-              <a:buNone/>
-              <a:defRPr sz="1600"/>
+            <a:lvl9pPr marL="975482" indent="0" algn="ctr">
+              <a:buNone/>
+              <a:defRPr sz="427"/>
             </a:lvl9pPr>
           </a:lstStyle>
           <a:p>
@@ -217,7 +222,7 @@
               <a:rPr lang="en-US"/>
               <a:t>Click to edit Master subtitle style</a:t>
             </a:r>
-            <a:endParaRPr lang="en-US"/>
+            <a:endParaRPr lang="en-US" dirty="0"/>
           </a:p>
         </p:txBody>
       </p:sp>
@@ -238,7 +243,7 @@
           <a:p>
             <a:fld id="{9EB2880A-EEE5-43D5-A408-71252EF6C5A2}" type="datetimeFigureOut">
               <a:rPr lang="en-US" smtClean="0"/>
-              <a:t>1/17/2018</a:t>
+              <a:t>1/20/2018</a:t>
             </a:fld>
             <a:endParaRPr lang="en-US"/>
           </a:p>
@@ -289,7 +294,7 @@
     </p:spTree>
     <p:extLst>
       <p:ext uri="{BB962C8B-B14F-4D97-AF65-F5344CB8AC3E}">
-        <p14:creationId xmlns:p14="http://schemas.microsoft.com/office/powerpoint/2010/main" val="2917325991"/>
+        <p14:creationId xmlns:p14="http://schemas.microsoft.com/office/powerpoint/2010/main" val="3942658188"/>
       </p:ext>
     </p:extLst>
   </p:cSld>
@@ -335,7 +340,7 @@
               <a:rPr lang="en-US"/>
               <a:t>Click to edit Master title style</a:t>
             </a:r>
-            <a:endParaRPr lang="en-US"/>
+            <a:endParaRPr lang="en-US" dirty="0"/>
           </a:p>
         </p:txBody>
       </p:sp>
@@ -387,7 +392,7 @@
               <a:rPr lang="en-US"/>
               <a:t>Fifth level</a:t>
             </a:r>
-            <a:endParaRPr lang="en-US"/>
+            <a:endParaRPr lang="en-US" dirty="0"/>
           </a:p>
         </p:txBody>
       </p:sp>
@@ -408,7 +413,7 @@
           <a:p>
             <a:fld id="{9EB2880A-EEE5-43D5-A408-71252EF6C5A2}" type="datetimeFigureOut">
               <a:rPr lang="en-US" smtClean="0"/>
-              <a:t>1/17/2018</a:t>
+              <a:t>1/20/2018</a:t>
             </a:fld>
             <a:endParaRPr lang="en-US"/>
           </a:p>
@@ -459,7 +464,7 @@
     </p:spTree>
     <p:extLst>
       <p:ext uri="{BB962C8B-B14F-4D97-AF65-F5344CB8AC3E}">
-        <p14:creationId xmlns:p14="http://schemas.microsoft.com/office/powerpoint/2010/main" val="2307941385"/>
+        <p14:creationId xmlns:p14="http://schemas.microsoft.com/office/powerpoint/2010/main" val="2227940766"/>
       </p:ext>
     </p:extLst>
   </p:cSld>
@@ -498,8 +503,8 @@
         </p:nvSpPr>
         <p:spPr>
           <a:xfrm>
-            <a:off x="8724900" y="365125"/>
-            <a:ext cx="2628900" cy="5811838"/>
+            <a:off x="4907756" y="97367"/>
+            <a:ext cx="1478756" cy="1549823"/>
           </a:xfrm>
         </p:spPr>
         <p:txBody>
@@ -510,7 +515,7 @@
               <a:rPr lang="en-US"/>
               <a:t>Click to edit Master title style</a:t>
             </a:r>
-            <a:endParaRPr lang="en-US"/>
+            <a:endParaRPr lang="en-US" dirty="0"/>
           </a:p>
         </p:txBody>
       </p:sp>
@@ -526,8 +531,8 @@
         </p:nvSpPr>
         <p:spPr>
           <a:xfrm>
-            <a:off x="838200" y="365125"/>
-            <a:ext cx="7734300" cy="5811838"/>
+            <a:off x="471487" y="97367"/>
+            <a:ext cx="4350544" cy="1549823"/>
           </a:xfrm>
         </p:spPr>
         <p:txBody>
@@ -567,7 +572,7 @@
               <a:rPr lang="en-US"/>
               <a:t>Fifth level</a:t>
             </a:r>
-            <a:endParaRPr lang="en-US"/>
+            <a:endParaRPr lang="en-US" dirty="0"/>
           </a:p>
         </p:txBody>
       </p:sp>
@@ -588,7 +593,7 @@
           <a:p>
             <a:fld id="{9EB2880A-EEE5-43D5-A408-71252EF6C5A2}" type="datetimeFigureOut">
               <a:rPr lang="en-US" smtClean="0"/>
-              <a:t>1/17/2018</a:t>
+              <a:t>1/20/2018</a:t>
             </a:fld>
             <a:endParaRPr lang="en-US"/>
           </a:p>
@@ -639,7 +644,7 @@
     </p:spTree>
     <p:extLst>
       <p:ext uri="{BB962C8B-B14F-4D97-AF65-F5344CB8AC3E}">
-        <p14:creationId xmlns:p14="http://schemas.microsoft.com/office/powerpoint/2010/main" val="345320954"/>
+        <p14:creationId xmlns:p14="http://schemas.microsoft.com/office/powerpoint/2010/main" val="2238202977"/>
       </p:ext>
     </p:extLst>
   </p:cSld>
@@ -685,7 +690,7 @@
               <a:rPr lang="en-US"/>
               <a:t>Click to edit Master title style</a:t>
             </a:r>
-            <a:endParaRPr lang="en-US"/>
+            <a:endParaRPr lang="en-US" dirty="0"/>
           </a:p>
         </p:txBody>
       </p:sp>
@@ -737,7 +742,7 @@
               <a:rPr lang="en-US"/>
               <a:t>Fifth level</a:t>
             </a:r>
-            <a:endParaRPr lang="en-US"/>
+            <a:endParaRPr lang="en-US" dirty="0"/>
           </a:p>
         </p:txBody>
       </p:sp>
@@ -758,7 +763,7 @@
           <a:p>
             <a:fld id="{9EB2880A-EEE5-43D5-A408-71252EF6C5A2}" type="datetimeFigureOut">
               <a:rPr lang="en-US" smtClean="0"/>
-              <a:t>1/17/2018</a:t>
+              <a:t>1/20/2018</a:t>
             </a:fld>
             <a:endParaRPr lang="en-US"/>
           </a:p>
@@ -809,7 +814,7 @@
     </p:spTree>
     <p:extLst>
       <p:ext uri="{BB962C8B-B14F-4D97-AF65-F5344CB8AC3E}">
-        <p14:creationId xmlns:p14="http://schemas.microsoft.com/office/powerpoint/2010/main" val="1870572040"/>
+        <p14:creationId xmlns:p14="http://schemas.microsoft.com/office/powerpoint/2010/main" val="4122329764"/>
       </p:ext>
     </p:extLst>
   </p:cSld>
@@ -848,15 +853,15 @@
         </p:nvSpPr>
         <p:spPr>
           <a:xfrm>
-            <a:off x="831850" y="1709738"/>
-            <a:ext cx="10515600" cy="2852737"/>
+            <a:off x="467916" y="455930"/>
+            <a:ext cx="5915025" cy="760730"/>
           </a:xfrm>
         </p:spPr>
         <p:txBody>
           <a:bodyPr anchor="b"/>
           <a:lstStyle>
             <a:lvl1pPr>
-              <a:defRPr sz="6000"/>
+              <a:defRPr sz="1600"/>
             </a:lvl1pPr>
           </a:lstStyle>
           <a:p>
@@ -864,7 +869,7 @@
               <a:rPr lang="en-US"/>
               <a:t>Click to edit Master title style</a:t>
             </a:r>
-            <a:endParaRPr lang="en-US"/>
+            <a:endParaRPr lang="en-US" dirty="0"/>
           </a:p>
         </p:txBody>
       </p:sp>
@@ -880,8 +885,8 @@
         </p:nvSpPr>
         <p:spPr>
           <a:xfrm>
-            <a:off x="831850" y="4589463"/>
-            <a:ext cx="10515600" cy="1500187"/>
+            <a:off x="467916" y="1223857"/>
+            <a:ext cx="5915025" cy="400050"/>
           </a:xfrm>
         </p:spPr>
         <p:txBody>
@@ -889,7 +894,7 @@
           <a:lstStyle>
             <a:lvl1pPr marL="0" indent="0">
               <a:buNone/>
-              <a:defRPr sz="2400">
+              <a:defRPr sz="640">
                 <a:solidFill>
                   <a:schemeClr val="tx1">
                     <a:tint val="75000"/>
@@ -897,9 +902,9 @@
                 </a:solidFill>
               </a:defRPr>
             </a:lvl1pPr>
-            <a:lvl2pPr marL="457200" indent="0">
-              <a:buNone/>
-              <a:defRPr sz="2000">
+            <a:lvl2pPr marL="121935" indent="0">
+              <a:buNone/>
+              <a:defRPr sz="533">
                 <a:solidFill>
                   <a:schemeClr val="tx1">
                     <a:tint val="75000"/>
@@ -907,9 +912,9 @@
                 </a:solidFill>
               </a:defRPr>
             </a:lvl2pPr>
-            <a:lvl3pPr marL="914400" indent="0">
-              <a:buNone/>
-              <a:defRPr sz="1800">
+            <a:lvl3pPr marL="243870" indent="0">
+              <a:buNone/>
+              <a:defRPr sz="480">
                 <a:solidFill>
                   <a:schemeClr val="tx1">
                     <a:tint val="75000"/>
@@ -917,9 +922,9 @@
                 </a:solidFill>
               </a:defRPr>
             </a:lvl3pPr>
-            <a:lvl4pPr marL="1371600" indent="0">
-              <a:buNone/>
-              <a:defRPr sz="1600">
+            <a:lvl4pPr marL="365806" indent="0">
+              <a:buNone/>
+              <a:defRPr sz="427">
                 <a:solidFill>
                   <a:schemeClr val="tx1">
                     <a:tint val="75000"/>
@@ -927,9 +932,9 @@
                 </a:solidFill>
               </a:defRPr>
             </a:lvl4pPr>
-            <a:lvl5pPr marL="1828800" indent="0">
-              <a:buNone/>
-              <a:defRPr sz="1600">
+            <a:lvl5pPr marL="487741" indent="0">
+              <a:buNone/>
+              <a:defRPr sz="427">
                 <a:solidFill>
                   <a:schemeClr val="tx1">
                     <a:tint val="75000"/>
@@ -937,9 +942,9 @@
                 </a:solidFill>
               </a:defRPr>
             </a:lvl5pPr>
-            <a:lvl6pPr marL="2286000" indent="0">
-              <a:buNone/>
-              <a:defRPr sz="1600">
+            <a:lvl6pPr marL="609676" indent="0">
+              <a:buNone/>
+              <a:defRPr sz="427">
                 <a:solidFill>
                   <a:schemeClr val="tx1">
                     <a:tint val="75000"/>
@@ -947,9 +952,9 @@
                 </a:solidFill>
               </a:defRPr>
             </a:lvl6pPr>
-            <a:lvl7pPr marL="2743200" indent="0">
-              <a:buNone/>
-              <a:defRPr sz="1600">
+            <a:lvl7pPr marL="731611" indent="0">
+              <a:buNone/>
+              <a:defRPr sz="427">
                 <a:solidFill>
                   <a:schemeClr val="tx1">
                     <a:tint val="75000"/>
@@ -957,9 +962,9 @@
                 </a:solidFill>
               </a:defRPr>
             </a:lvl7pPr>
-            <a:lvl8pPr marL="3200400" indent="0">
-              <a:buNone/>
-              <a:defRPr sz="1600">
+            <a:lvl8pPr marL="853547" indent="0">
+              <a:buNone/>
+              <a:defRPr sz="427">
                 <a:solidFill>
                   <a:schemeClr val="tx1">
                     <a:tint val="75000"/>
@@ -967,9 +972,9 @@
                 </a:solidFill>
               </a:defRPr>
             </a:lvl8pPr>
-            <a:lvl9pPr marL="3657600" indent="0">
-              <a:buNone/>
-              <a:defRPr sz="1600">
+            <a:lvl9pPr marL="975482" indent="0">
+              <a:buNone/>
+              <a:defRPr sz="427">
                 <a:solidFill>
                   <a:schemeClr val="tx1">
                     <a:tint val="75000"/>
@@ -1004,7 +1009,7 @@
           <a:p>
             <a:fld id="{9EB2880A-EEE5-43D5-A408-71252EF6C5A2}" type="datetimeFigureOut">
               <a:rPr lang="en-US" smtClean="0"/>
-              <a:t>1/17/2018</a:t>
+              <a:t>1/20/2018</a:t>
             </a:fld>
             <a:endParaRPr lang="en-US"/>
           </a:p>
@@ -1055,7 +1060,7 @@
     </p:spTree>
     <p:extLst>
       <p:ext uri="{BB962C8B-B14F-4D97-AF65-F5344CB8AC3E}">
-        <p14:creationId xmlns:p14="http://schemas.microsoft.com/office/powerpoint/2010/main" val="3658139121"/>
+        <p14:creationId xmlns:p14="http://schemas.microsoft.com/office/powerpoint/2010/main" val="1761081235"/>
       </p:ext>
     </p:extLst>
   </p:cSld>
@@ -1101,7 +1106,7 @@
               <a:rPr lang="en-US"/>
               <a:t>Click to edit Master title style</a:t>
             </a:r>
-            <a:endParaRPr lang="en-US"/>
+            <a:endParaRPr lang="en-US" dirty="0"/>
           </a:p>
         </p:txBody>
       </p:sp>
@@ -1117,8 +1122,8 @@
         </p:nvSpPr>
         <p:spPr>
           <a:xfrm>
-            <a:off x="838200" y="1825625"/>
-            <a:ext cx="5181600" cy="4351338"/>
+            <a:off x="471488" y="486833"/>
+            <a:ext cx="2914650" cy="1160357"/>
           </a:xfrm>
         </p:spPr>
         <p:txBody>
@@ -1158,7 +1163,7 @@
               <a:rPr lang="en-US"/>
               <a:t>Fifth level</a:t>
             </a:r>
-            <a:endParaRPr lang="en-US"/>
+            <a:endParaRPr lang="en-US" dirty="0"/>
           </a:p>
         </p:txBody>
       </p:sp>
@@ -1174,8 +1179,8 @@
         </p:nvSpPr>
         <p:spPr>
           <a:xfrm>
-            <a:off x="6172200" y="1825625"/>
-            <a:ext cx="5181600" cy="4351338"/>
+            <a:off x="3471863" y="486833"/>
+            <a:ext cx="2914650" cy="1160357"/>
           </a:xfrm>
         </p:spPr>
         <p:txBody>
@@ -1215,7 +1220,7 @@
               <a:rPr lang="en-US"/>
               <a:t>Fifth level</a:t>
             </a:r>
-            <a:endParaRPr lang="en-US"/>
+            <a:endParaRPr lang="en-US" dirty="0"/>
           </a:p>
         </p:txBody>
       </p:sp>
@@ -1236,7 +1241,7 @@
           <a:p>
             <a:fld id="{9EB2880A-EEE5-43D5-A408-71252EF6C5A2}" type="datetimeFigureOut">
               <a:rPr lang="en-US" smtClean="0"/>
-              <a:t>1/17/2018</a:t>
+              <a:t>1/20/2018</a:t>
             </a:fld>
             <a:endParaRPr lang="en-US"/>
           </a:p>
@@ -1287,7 +1292,7 @@
     </p:spTree>
     <p:extLst>
       <p:ext uri="{BB962C8B-B14F-4D97-AF65-F5344CB8AC3E}">
-        <p14:creationId xmlns:p14="http://schemas.microsoft.com/office/powerpoint/2010/main" val="1368967066"/>
+        <p14:creationId xmlns:p14="http://schemas.microsoft.com/office/powerpoint/2010/main" val="959373697"/>
       </p:ext>
     </p:extLst>
   </p:cSld>
@@ -1326,8 +1331,8 @@
         </p:nvSpPr>
         <p:spPr>
           <a:xfrm>
-            <a:off x="839788" y="365125"/>
-            <a:ext cx="10515600" cy="1325563"/>
+            <a:off x="472381" y="97367"/>
+            <a:ext cx="5915025" cy="353483"/>
           </a:xfrm>
         </p:spPr>
         <p:txBody>
@@ -1338,7 +1343,7 @@
               <a:rPr lang="en-US"/>
               <a:t>Click to edit Master title style</a:t>
             </a:r>
-            <a:endParaRPr lang="en-US"/>
+            <a:endParaRPr lang="en-US" dirty="0"/>
           </a:p>
         </p:txBody>
       </p:sp>
@@ -1354,8 +1359,8 @@
         </p:nvSpPr>
         <p:spPr>
           <a:xfrm>
-            <a:off x="839788" y="1681163"/>
-            <a:ext cx="5157787" cy="823912"/>
+            <a:off x="472381" y="448310"/>
+            <a:ext cx="2901255" cy="219710"/>
           </a:xfrm>
         </p:spPr>
         <p:txBody>
@@ -1363,39 +1368,39 @@
           <a:lstStyle>
             <a:lvl1pPr marL="0" indent="0">
               <a:buNone/>
-              <a:defRPr sz="2400" b="1"/>
+              <a:defRPr sz="640" b="1"/>
             </a:lvl1pPr>
-            <a:lvl2pPr marL="457200" indent="0">
-              <a:buNone/>
-              <a:defRPr sz="2000" b="1"/>
+            <a:lvl2pPr marL="121935" indent="0">
+              <a:buNone/>
+              <a:defRPr sz="533" b="1"/>
             </a:lvl2pPr>
-            <a:lvl3pPr marL="914400" indent="0">
-              <a:buNone/>
-              <a:defRPr sz="1800" b="1"/>
+            <a:lvl3pPr marL="243870" indent="0">
+              <a:buNone/>
+              <a:defRPr sz="480" b="1"/>
             </a:lvl3pPr>
-            <a:lvl4pPr marL="1371600" indent="0">
-              <a:buNone/>
-              <a:defRPr sz="1600" b="1"/>
+            <a:lvl4pPr marL="365806" indent="0">
+              <a:buNone/>
+              <a:defRPr sz="427" b="1"/>
             </a:lvl4pPr>
-            <a:lvl5pPr marL="1828800" indent="0">
-              <a:buNone/>
-              <a:defRPr sz="1600" b="1"/>
+            <a:lvl5pPr marL="487741" indent="0">
+              <a:buNone/>
+              <a:defRPr sz="427" b="1"/>
             </a:lvl5pPr>
-            <a:lvl6pPr marL="2286000" indent="0">
-              <a:buNone/>
-              <a:defRPr sz="1600" b="1"/>
+            <a:lvl6pPr marL="609676" indent="0">
+              <a:buNone/>
+              <a:defRPr sz="427" b="1"/>
             </a:lvl6pPr>
-            <a:lvl7pPr marL="2743200" indent="0">
-              <a:buNone/>
-              <a:defRPr sz="1600" b="1"/>
+            <a:lvl7pPr marL="731611" indent="0">
+              <a:buNone/>
+              <a:defRPr sz="427" b="1"/>
             </a:lvl7pPr>
-            <a:lvl8pPr marL="3200400" indent="0">
-              <a:buNone/>
-              <a:defRPr sz="1600" b="1"/>
+            <a:lvl8pPr marL="853547" indent="0">
+              <a:buNone/>
+              <a:defRPr sz="427" b="1"/>
             </a:lvl8pPr>
-            <a:lvl9pPr marL="3657600" indent="0">
-              <a:buNone/>
-              <a:defRPr sz="1600" b="1"/>
+            <a:lvl9pPr marL="975482" indent="0">
+              <a:buNone/>
+              <a:defRPr sz="427" b="1"/>
             </a:lvl9pPr>
           </a:lstStyle>
           <a:p>
@@ -1419,8 +1424,8 @@
         </p:nvSpPr>
         <p:spPr>
           <a:xfrm>
-            <a:off x="839788" y="2505075"/>
-            <a:ext cx="5157787" cy="3684588"/>
+            <a:off x="472381" y="668020"/>
+            <a:ext cx="2901255" cy="982557"/>
           </a:xfrm>
         </p:spPr>
         <p:txBody>
@@ -1460,7 +1465,7 @@
               <a:rPr lang="en-US"/>
               <a:t>Fifth level</a:t>
             </a:r>
-            <a:endParaRPr lang="en-US"/>
+            <a:endParaRPr lang="en-US" dirty="0"/>
           </a:p>
         </p:txBody>
       </p:sp>
@@ -1476,8 +1481,8 @@
         </p:nvSpPr>
         <p:spPr>
           <a:xfrm>
-            <a:off x="6172200" y="1681163"/>
-            <a:ext cx="5183188" cy="823912"/>
+            <a:off x="3471863" y="448310"/>
+            <a:ext cx="2915543" cy="219710"/>
           </a:xfrm>
         </p:spPr>
         <p:txBody>
@@ -1485,39 +1490,39 @@
           <a:lstStyle>
             <a:lvl1pPr marL="0" indent="0">
               <a:buNone/>
-              <a:defRPr sz="2400" b="1"/>
+              <a:defRPr sz="640" b="1"/>
             </a:lvl1pPr>
-            <a:lvl2pPr marL="457200" indent="0">
-              <a:buNone/>
-              <a:defRPr sz="2000" b="1"/>
+            <a:lvl2pPr marL="121935" indent="0">
+              <a:buNone/>
+              <a:defRPr sz="533" b="1"/>
             </a:lvl2pPr>
-            <a:lvl3pPr marL="914400" indent="0">
-              <a:buNone/>
-              <a:defRPr sz="1800" b="1"/>
+            <a:lvl3pPr marL="243870" indent="0">
+              <a:buNone/>
+              <a:defRPr sz="480" b="1"/>
             </a:lvl3pPr>
-            <a:lvl4pPr marL="1371600" indent="0">
-              <a:buNone/>
-              <a:defRPr sz="1600" b="1"/>
+            <a:lvl4pPr marL="365806" indent="0">
+              <a:buNone/>
+              <a:defRPr sz="427" b="1"/>
             </a:lvl4pPr>
-            <a:lvl5pPr marL="1828800" indent="0">
-              <a:buNone/>
-              <a:defRPr sz="1600" b="1"/>
+            <a:lvl5pPr marL="487741" indent="0">
+              <a:buNone/>
+              <a:defRPr sz="427" b="1"/>
             </a:lvl5pPr>
-            <a:lvl6pPr marL="2286000" indent="0">
-              <a:buNone/>
-              <a:defRPr sz="1600" b="1"/>
+            <a:lvl6pPr marL="609676" indent="0">
+              <a:buNone/>
+              <a:defRPr sz="427" b="1"/>
             </a:lvl6pPr>
-            <a:lvl7pPr marL="2743200" indent="0">
-              <a:buNone/>
-              <a:defRPr sz="1600" b="1"/>
+            <a:lvl7pPr marL="731611" indent="0">
+              <a:buNone/>
+              <a:defRPr sz="427" b="1"/>
             </a:lvl7pPr>
-            <a:lvl8pPr marL="3200400" indent="0">
-              <a:buNone/>
-              <a:defRPr sz="1600" b="1"/>
+            <a:lvl8pPr marL="853547" indent="0">
+              <a:buNone/>
+              <a:defRPr sz="427" b="1"/>
             </a:lvl8pPr>
-            <a:lvl9pPr marL="3657600" indent="0">
-              <a:buNone/>
-              <a:defRPr sz="1600" b="1"/>
+            <a:lvl9pPr marL="975482" indent="0">
+              <a:buNone/>
+              <a:defRPr sz="427" b="1"/>
             </a:lvl9pPr>
           </a:lstStyle>
           <a:p>
@@ -1541,8 +1546,8 @@
         </p:nvSpPr>
         <p:spPr>
           <a:xfrm>
-            <a:off x="6172200" y="2505075"/>
-            <a:ext cx="5183188" cy="3684588"/>
+            <a:off x="3471863" y="668020"/>
+            <a:ext cx="2915543" cy="982557"/>
           </a:xfrm>
         </p:spPr>
         <p:txBody>
@@ -1582,7 +1587,7 @@
               <a:rPr lang="en-US"/>
               <a:t>Fifth level</a:t>
             </a:r>
-            <a:endParaRPr lang="en-US"/>
+            <a:endParaRPr lang="en-US" dirty="0"/>
           </a:p>
         </p:txBody>
       </p:sp>
@@ -1603,7 +1608,7 @@
           <a:p>
             <a:fld id="{9EB2880A-EEE5-43D5-A408-71252EF6C5A2}" type="datetimeFigureOut">
               <a:rPr lang="en-US" smtClean="0"/>
-              <a:t>1/17/2018</a:t>
+              <a:t>1/20/2018</a:t>
             </a:fld>
             <a:endParaRPr lang="en-US"/>
           </a:p>
@@ -1654,7 +1659,7 @@
     </p:spTree>
     <p:extLst>
       <p:ext uri="{BB962C8B-B14F-4D97-AF65-F5344CB8AC3E}">
-        <p14:creationId xmlns:p14="http://schemas.microsoft.com/office/powerpoint/2010/main" val="2567246986"/>
+        <p14:creationId xmlns:p14="http://schemas.microsoft.com/office/powerpoint/2010/main" val="2619441814"/>
       </p:ext>
     </p:extLst>
   </p:cSld>
@@ -1700,7 +1705,7 @@
               <a:rPr lang="en-US"/>
               <a:t>Click to edit Master title style</a:t>
             </a:r>
-            <a:endParaRPr lang="en-US"/>
+            <a:endParaRPr lang="en-US" dirty="0"/>
           </a:p>
         </p:txBody>
       </p:sp>
@@ -1721,7 +1726,7 @@
           <a:p>
             <a:fld id="{9EB2880A-EEE5-43D5-A408-71252EF6C5A2}" type="datetimeFigureOut">
               <a:rPr lang="en-US" smtClean="0"/>
-              <a:t>1/17/2018</a:t>
+              <a:t>1/20/2018</a:t>
             </a:fld>
             <a:endParaRPr lang="en-US"/>
           </a:p>
@@ -1772,7 +1777,7 @@
     </p:spTree>
     <p:extLst>
       <p:ext uri="{BB962C8B-B14F-4D97-AF65-F5344CB8AC3E}">
-        <p14:creationId xmlns:p14="http://schemas.microsoft.com/office/powerpoint/2010/main" val="4204273831"/>
+        <p14:creationId xmlns:p14="http://schemas.microsoft.com/office/powerpoint/2010/main" val="4234823534"/>
       </p:ext>
     </p:extLst>
   </p:cSld>
@@ -1816,7 +1821,7 @@
           <a:p>
             <a:fld id="{9EB2880A-EEE5-43D5-A408-71252EF6C5A2}" type="datetimeFigureOut">
               <a:rPr lang="en-US" smtClean="0"/>
-              <a:t>1/17/2018</a:t>
+              <a:t>1/20/2018</a:t>
             </a:fld>
             <a:endParaRPr lang="en-US"/>
           </a:p>
@@ -1867,7 +1872,7 @@
     </p:spTree>
     <p:extLst>
       <p:ext uri="{BB962C8B-B14F-4D97-AF65-F5344CB8AC3E}">
-        <p14:creationId xmlns:p14="http://schemas.microsoft.com/office/powerpoint/2010/main" val="3654292661"/>
+        <p14:creationId xmlns:p14="http://schemas.microsoft.com/office/powerpoint/2010/main" val="3173494463"/>
       </p:ext>
     </p:extLst>
   </p:cSld>
@@ -1906,15 +1911,15 @@
         </p:nvSpPr>
         <p:spPr>
           <a:xfrm>
-            <a:off x="839788" y="457200"/>
-            <a:ext cx="3932237" cy="1600200"/>
+            <a:off x="472381" y="121920"/>
+            <a:ext cx="2211883" cy="426720"/>
           </a:xfrm>
         </p:spPr>
         <p:txBody>
           <a:bodyPr anchor="b"/>
           <a:lstStyle>
             <a:lvl1pPr>
-              <a:defRPr sz="3200"/>
+              <a:defRPr sz="853"/>
             </a:lvl1pPr>
           </a:lstStyle>
           <a:p>
@@ -1922,7 +1927,7 @@
               <a:rPr lang="en-US"/>
               <a:t>Click to edit Master title style</a:t>
             </a:r>
-            <a:endParaRPr lang="en-US"/>
+            <a:endParaRPr lang="en-US" dirty="0"/>
           </a:p>
         </p:txBody>
       </p:sp>
@@ -1938,39 +1943,39 @@
         </p:nvSpPr>
         <p:spPr>
           <a:xfrm>
-            <a:off x="5183188" y="987425"/>
-            <a:ext cx="6172200" cy="4873625"/>
+            <a:off x="2915543" y="263314"/>
+            <a:ext cx="3471863" cy="1299633"/>
           </a:xfrm>
         </p:spPr>
         <p:txBody>
           <a:bodyPr/>
           <a:lstStyle>
             <a:lvl1pPr>
-              <a:defRPr sz="3200"/>
+              <a:defRPr sz="853"/>
             </a:lvl1pPr>
             <a:lvl2pPr>
-              <a:defRPr sz="2800"/>
+              <a:defRPr sz="747"/>
             </a:lvl2pPr>
             <a:lvl3pPr>
-              <a:defRPr sz="2400"/>
+              <a:defRPr sz="640"/>
             </a:lvl3pPr>
             <a:lvl4pPr>
-              <a:defRPr sz="2000"/>
+              <a:defRPr sz="533"/>
             </a:lvl4pPr>
             <a:lvl5pPr>
-              <a:defRPr sz="2000"/>
+              <a:defRPr sz="533"/>
             </a:lvl5pPr>
             <a:lvl6pPr>
-              <a:defRPr sz="2000"/>
+              <a:defRPr sz="533"/>
             </a:lvl6pPr>
             <a:lvl7pPr>
-              <a:defRPr sz="2000"/>
+              <a:defRPr sz="533"/>
             </a:lvl7pPr>
             <a:lvl8pPr>
-              <a:defRPr sz="2000"/>
+              <a:defRPr sz="533"/>
             </a:lvl8pPr>
             <a:lvl9pPr>
-              <a:defRPr sz="2000"/>
+              <a:defRPr sz="533"/>
             </a:lvl9pPr>
           </a:lstStyle>
           <a:p>
@@ -2007,7 +2012,7 @@
               <a:rPr lang="en-US"/>
               <a:t>Fifth level</a:t>
             </a:r>
-            <a:endParaRPr lang="en-US"/>
+            <a:endParaRPr lang="en-US" dirty="0"/>
           </a:p>
         </p:txBody>
       </p:sp>
@@ -2023,8 +2028,8 @@
         </p:nvSpPr>
         <p:spPr>
           <a:xfrm>
-            <a:off x="839788" y="2057400"/>
-            <a:ext cx="3932237" cy="3811588"/>
+            <a:off x="472381" y="548640"/>
+            <a:ext cx="2211883" cy="1016423"/>
           </a:xfrm>
         </p:spPr>
         <p:txBody>
@@ -2032,39 +2037,39 @@
           <a:lstStyle>
             <a:lvl1pPr marL="0" indent="0">
               <a:buNone/>
-              <a:defRPr sz="1600"/>
+              <a:defRPr sz="427"/>
             </a:lvl1pPr>
-            <a:lvl2pPr marL="457200" indent="0">
-              <a:buNone/>
-              <a:defRPr sz="1400"/>
+            <a:lvl2pPr marL="121935" indent="0">
+              <a:buNone/>
+              <a:defRPr sz="373"/>
             </a:lvl2pPr>
-            <a:lvl3pPr marL="914400" indent="0">
-              <a:buNone/>
-              <a:defRPr sz="1200"/>
+            <a:lvl3pPr marL="243870" indent="0">
+              <a:buNone/>
+              <a:defRPr sz="320"/>
             </a:lvl3pPr>
-            <a:lvl4pPr marL="1371600" indent="0">
-              <a:buNone/>
-              <a:defRPr sz="1000"/>
+            <a:lvl4pPr marL="365806" indent="0">
+              <a:buNone/>
+              <a:defRPr sz="267"/>
             </a:lvl4pPr>
-            <a:lvl5pPr marL="1828800" indent="0">
-              <a:buNone/>
-              <a:defRPr sz="1000"/>
+            <a:lvl5pPr marL="487741" indent="0">
+              <a:buNone/>
+              <a:defRPr sz="267"/>
             </a:lvl5pPr>
-            <a:lvl6pPr marL="2286000" indent="0">
-              <a:buNone/>
-              <a:defRPr sz="1000"/>
+            <a:lvl6pPr marL="609676" indent="0">
+              <a:buNone/>
+              <a:defRPr sz="267"/>
             </a:lvl6pPr>
-            <a:lvl7pPr marL="2743200" indent="0">
-              <a:buNone/>
-              <a:defRPr sz="1000"/>
+            <a:lvl7pPr marL="731611" indent="0">
+              <a:buNone/>
+              <a:defRPr sz="267"/>
             </a:lvl7pPr>
-            <a:lvl8pPr marL="3200400" indent="0">
-              <a:buNone/>
-              <a:defRPr sz="1000"/>
+            <a:lvl8pPr marL="853547" indent="0">
+              <a:buNone/>
+              <a:defRPr sz="267"/>
             </a:lvl8pPr>
-            <a:lvl9pPr marL="3657600" indent="0">
-              <a:buNone/>
-              <a:defRPr sz="1000"/>
+            <a:lvl9pPr marL="975482" indent="0">
+              <a:buNone/>
+              <a:defRPr sz="267"/>
             </a:lvl9pPr>
           </a:lstStyle>
           <a:p>
@@ -2093,7 +2098,7 @@
           <a:p>
             <a:fld id="{9EB2880A-EEE5-43D5-A408-71252EF6C5A2}" type="datetimeFigureOut">
               <a:rPr lang="en-US" smtClean="0"/>
-              <a:t>1/17/2018</a:t>
+              <a:t>1/20/2018</a:t>
             </a:fld>
             <a:endParaRPr lang="en-US"/>
           </a:p>
@@ -2144,7 +2149,7 @@
     </p:spTree>
     <p:extLst>
       <p:ext uri="{BB962C8B-B14F-4D97-AF65-F5344CB8AC3E}">
-        <p14:creationId xmlns:p14="http://schemas.microsoft.com/office/powerpoint/2010/main" val="2312727832"/>
+        <p14:creationId xmlns:p14="http://schemas.microsoft.com/office/powerpoint/2010/main" val="666338283"/>
       </p:ext>
     </p:extLst>
   </p:cSld>
@@ -2183,15 +2188,15 @@
         </p:nvSpPr>
         <p:spPr>
           <a:xfrm>
-            <a:off x="839788" y="457200"/>
-            <a:ext cx="3932237" cy="1600200"/>
+            <a:off x="472381" y="121920"/>
+            <a:ext cx="2211883" cy="426720"/>
           </a:xfrm>
         </p:spPr>
         <p:txBody>
           <a:bodyPr anchor="b"/>
           <a:lstStyle>
             <a:lvl1pPr>
-              <a:defRPr sz="3200"/>
+              <a:defRPr sz="853"/>
             </a:lvl1pPr>
           </a:lstStyle>
           <a:p>
@@ -2199,7 +2204,7 @@
               <a:rPr lang="en-US"/>
               <a:t>Click to edit Master title style</a:t>
             </a:r>
-            <a:endParaRPr lang="en-US"/>
+            <a:endParaRPr lang="en-US" dirty="0"/>
           </a:p>
         </p:txBody>
       </p:sp>
@@ -2207,7 +2212,7 @@
         <p:nvSpPr>
           <p:cNvPr id="3" name="Picture Placeholder 2"/>
           <p:cNvSpPr>
-            <a:spLocks noGrp="1"/>
+            <a:spLocks noGrp="1" noChangeAspect="1"/>
           </p:cNvSpPr>
           <p:nvPr>
             <p:ph type="pic" idx="1"/>
@@ -2215,52 +2220,56 @@
         </p:nvSpPr>
         <p:spPr>
           <a:xfrm>
-            <a:off x="5183188" y="987425"/>
-            <a:ext cx="6172200" cy="4873625"/>
-          </a:xfrm>
-        </p:spPr>
-        <p:txBody>
-          <a:bodyPr/>
+            <a:off x="2915543" y="263314"/>
+            <a:ext cx="3471863" cy="1299633"/>
+          </a:xfrm>
+        </p:spPr>
+        <p:txBody>
+          <a:bodyPr anchor="t"/>
           <a:lstStyle>
             <a:lvl1pPr marL="0" indent="0">
               <a:buNone/>
-              <a:defRPr sz="3200"/>
+              <a:defRPr sz="853"/>
             </a:lvl1pPr>
-            <a:lvl2pPr marL="457200" indent="0">
-              <a:buNone/>
-              <a:defRPr sz="2800"/>
+            <a:lvl2pPr marL="121935" indent="0">
+              <a:buNone/>
+              <a:defRPr sz="747"/>
             </a:lvl2pPr>
-            <a:lvl3pPr marL="914400" indent="0">
-              <a:buNone/>
-              <a:defRPr sz="2400"/>
+            <a:lvl3pPr marL="243870" indent="0">
+              <a:buNone/>
+              <a:defRPr sz="640"/>
             </a:lvl3pPr>
-            <a:lvl4pPr marL="1371600" indent="0">
-              <a:buNone/>
-              <a:defRPr sz="2000"/>
+            <a:lvl4pPr marL="365806" indent="0">
+              <a:buNone/>
+              <a:defRPr sz="533"/>
             </a:lvl4pPr>
-            <a:lvl5pPr marL="1828800" indent="0">
-              <a:buNone/>
-              <a:defRPr sz="2000"/>
+            <a:lvl5pPr marL="487741" indent="0">
+              <a:buNone/>
+              <a:defRPr sz="533"/>
             </a:lvl5pPr>
-            <a:lvl6pPr marL="2286000" indent="0">
-              <a:buNone/>
-              <a:defRPr sz="2000"/>
+            <a:lvl6pPr marL="609676" indent="0">
+              <a:buNone/>
+              <a:defRPr sz="533"/>
             </a:lvl6pPr>
-            <a:lvl7pPr marL="2743200" indent="0">
-              <a:buNone/>
-              <a:defRPr sz="2000"/>
+            <a:lvl7pPr marL="731611" indent="0">
+              <a:buNone/>
+              <a:defRPr sz="533"/>
             </a:lvl7pPr>
-            <a:lvl8pPr marL="3200400" indent="0">
-              <a:buNone/>
-              <a:defRPr sz="2000"/>
+            <a:lvl8pPr marL="853547" indent="0">
+              <a:buNone/>
+              <a:defRPr sz="533"/>
             </a:lvl8pPr>
-            <a:lvl9pPr marL="3657600" indent="0">
-              <a:buNone/>
-              <a:defRPr sz="2000"/>
+            <a:lvl9pPr marL="975482" indent="0">
+              <a:buNone/>
+              <a:defRPr sz="533"/>
             </a:lvl9pPr>
           </a:lstStyle>
           <a:p>
-            <a:endParaRPr lang="en-US"/>
+            <a:r>
+              <a:rPr lang="en-US"/>
+              <a:t>Click icon to add picture</a:t>
+            </a:r>
+            <a:endParaRPr lang="en-US" dirty="0"/>
           </a:p>
         </p:txBody>
       </p:sp>
@@ -2276,8 +2285,8 @@
         </p:nvSpPr>
         <p:spPr>
           <a:xfrm>
-            <a:off x="839788" y="2057400"/>
-            <a:ext cx="3932237" cy="3811588"/>
+            <a:off x="472381" y="548640"/>
+            <a:ext cx="2211883" cy="1016423"/>
           </a:xfrm>
         </p:spPr>
         <p:txBody>
@@ -2285,39 +2294,39 @@
           <a:lstStyle>
             <a:lvl1pPr marL="0" indent="0">
               <a:buNone/>
-              <a:defRPr sz="1600"/>
+              <a:defRPr sz="427"/>
             </a:lvl1pPr>
-            <a:lvl2pPr marL="457200" indent="0">
-              <a:buNone/>
-              <a:defRPr sz="1400"/>
+            <a:lvl2pPr marL="121935" indent="0">
+              <a:buNone/>
+              <a:defRPr sz="373"/>
             </a:lvl2pPr>
-            <a:lvl3pPr marL="914400" indent="0">
-              <a:buNone/>
-              <a:defRPr sz="1200"/>
+            <a:lvl3pPr marL="243870" indent="0">
+              <a:buNone/>
+              <a:defRPr sz="320"/>
             </a:lvl3pPr>
-            <a:lvl4pPr marL="1371600" indent="0">
-              <a:buNone/>
-              <a:defRPr sz="1000"/>
+            <a:lvl4pPr marL="365806" indent="0">
+              <a:buNone/>
+              <a:defRPr sz="267"/>
             </a:lvl4pPr>
-            <a:lvl5pPr marL="1828800" indent="0">
-              <a:buNone/>
-              <a:defRPr sz="1000"/>
+            <a:lvl5pPr marL="487741" indent="0">
+              <a:buNone/>
+              <a:defRPr sz="267"/>
             </a:lvl5pPr>
-            <a:lvl6pPr marL="2286000" indent="0">
-              <a:buNone/>
-              <a:defRPr sz="1000"/>
+            <a:lvl6pPr marL="609676" indent="0">
+              <a:buNone/>
+              <a:defRPr sz="267"/>
             </a:lvl6pPr>
-            <a:lvl7pPr marL="2743200" indent="0">
-              <a:buNone/>
-              <a:defRPr sz="1000"/>
+            <a:lvl7pPr marL="731611" indent="0">
+              <a:buNone/>
+              <a:defRPr sz="267"/>
             </a:lvl7pPr>
-            <a:lvl8pPr marL="3200400" indent="0">
-              <a:buNone/>
-              <a:defRPr sz="1000"/>
+            <a:lvl8pPr marL="853547" indent="0">
+              <a:buNone/>
+              <a:defRPr sz="267"/>
             </a:lvl8pPr>
-            <a:lvl9pPr marL="3657600" indent="0">
-              <a:buNone/>
-              <a:defRPr sz="1000"/>
+            <a:lvl9pPr marL="975482" indent="0">
+              <a:buNone/>
+              <a:defRPr sz="267"/>
             </a:lvl9pPr>
           </a:lstStyle>
           <a:p>
@@ -2346,7 +2355,7 @@
           <a:p>
             <a:fld id="{9EB2880A-EEE5-43D5-A408-71252EF6C5A2}" type="datetimeFigureOut">
               <a:rPr lang="en-US" smtClean="0"/>
-              <a:t>1/17/2018</a:t>
+              <a:t>1/20/2018</a:t>
             </a:fld>
             <a:endParaRPr lang="en-US"/>
           </a:p>
@@ -2397,7 +2406,7 @@
     </p:spTree>
     <p:extLst>
       <p:ext uri="{BB962C8B-B14F-4D97-AF65-F5344CB8AC3E}">
-        <p14:creationId xmlns:p14="http://schemas.microsoft.com/office/powerpoint/2010/main" val="2155455472"/>
+        <p14:creationId xmlns:p14="http://schemas.microsoft.com/office/powerpoint/2010/main" val="1361929366"/>
       </p:ext>
     </p:extLst>
   </p:cSld>
@@ -2441,8 +2450,8 @@
         </p:nvSpPr>
         <p:spPr>
           <a:xfrm>
-            <a:off x="838200" y="365125"/>
-            <a:ext cx="10515600" cy="1325563"/>
+            <a:off x="471488" y="97367"/>
+            <a:ext cx="5915025" cy="353483"/>
           </a:xfrm>
           <a:prstGeom prst="rect">
             <a:avLst/>
@@ -2458,7 +2467,7 @@
               <a:rPr lang="en-US"/>
               <a:t>Click to edit Master title style</a:t>
             </a:r>
-            <a:endParaRPr lang="en-US"/>
+            <a:endParaRPr lang="en-US" dirty="0"/>
           </a:p>
         </p:txBody>
       </p:sp>
@@ -2474,8 +2483,8 @@
         </p:nvSpPr>
         <p:spPr>
           <a:xfrm>
-            <a:off x="838200" y="1825625"/>
-            <a:ext cx="10515600" cy="4351338"/>
+            <a:off x="471488" y="486833"/>
+            <a:ext cx="5915025" cy="1160357"/>
           </a:xfrm>
           <a:prstGeom prst="rect">
             <a:avLst/>
@@ -2520,7 +2529,7 @@
               <a:rPr lang="en-US"/>
               <a:t>Fifth level</a:t>
             </a:r>
-            <a:endParaRPr lang="en-US"/>
+            <a:endParaRPr lang="en-US" dirty="0"/>
           </a:p>
         </p:txBody>
       </p:sp>
@@ -2536,8 +2545,8 @@
         </p:nvSpPr>
         <p:spPr>
           <a:xfrm>
-            <a:off x="838200" y="6356350"/>
-            <a:ext cx="2743200" cy="365125"/>
+            <a:off x="471488" y="1695027"/>
+            <a:ext cx="1543050" cy="97367"/>
           </a:xfrm>
           <a:prstGeom prst="rect">
             <a:avLst/>
@@ -2547,7 +2556,7 @@
           <a:bodyPr vert="horz" lIns="91440" tIns="45720" rIns="91440" bIns="45720" rtlCol="0" anchor="ctr"/>
           <a:lstStyle>
             <a:lvl1pPr algn="l">
-              <a:defRPr sz="1200">
+              <a:defRPr sz="320">
                 <a:solidFill>
                   <a:schemeClr val="tx1">
                     <a:tint val="75000"/>
@@ -2559,7 +2568,7 @@
           <a:p>
             <a:fld id="{9EB2880A-EEE5-43D5-A408-71252EF6C5A2}" type="datetimeFigureOut">
               <a:rPr lang="en-US" smtClean="0"/>
-              <a:t>1/17/2018</a:t>
+              <a:t>1/20/2018</a:t>
             </a:fld>
             <a:endParaRPr lang="en-US"/>
           </a:p>
@@ -2577,8 +2586,8 @@
         </p:nvSpPr>
         <p:spPr>
           <a:xfrm>
-            <a:off x="4038600" y="6356350"/>
-            <a:ext cx="4114800" cy="365125"/>
+            <a:off x="2271713" y="1695027"/>
+            <a:ext cx="2314575" cy="97367"/>
           </a:xfrm>
           <a:prstGeom prst="rect">
             <a:avLst/>
@@ -2588,7 +2597,7 @@
           <a:bodyPr vert="horz" lIns="91440" tIns="45720" rIns="91440" bIns="45720" rtlCol="0" anchor="ctr"/>
           <a:lstStyle>
             <a:lvl1pPr algn="ctr">
-              <a:defRPr sz="1200">
+              <a:defRPr sz="320">
                 <a:solidFill>
                   <a:schemeClr val="tx1">
                     <a:tint val="75000"/>
@@ -2614,8 +2623,8 @@
         </p:nvSpPr>
         <p:spPr>
           <a:xfrm>
-            <a:off x="8610600" y="6356350"/>
-            <a:ext cx="2743200" cy="365125"/>
+            <a:off x="4843463" y="1695027"/>
+            <a:ext cx="1543050" cy="97367"/>
           </a:xfrm>
           <a:prstGeom prst="rect">
             <a:avLst/>
@@ -2625,7 +2634,7 @@
           <a:bodyPr vert="horz" lIns="91440" tIns="45720" rIns="91440" bIns="45720" rtlCol="0" anchor="ctr"/>
           <a:lstStyle>
             <a:lvl1pPr algn="r">
-              <a:defRPr sz="1200">
+              <a:defRPr sz="320">
                 <a:solidFill>
                   <a:schemeClr val="tx1">
                     <a:tint val="75000"/>
@@ -2646,27 +2655,27 @@
     </p:spTree>
     <p:extLst>
       <p:ext uri="{BB962C8B-B14F-4D97-AF65-F5344CB8AC3E}">
-        <p14:creationId xmlns:p14="http://schemas.microsoft.com/office/powerpoint/2010/main" val="2150152545"/>
+        <p14:creationId xmlns:p14="http://schemas.microsoft.com/office/powerpoint/2010/main" val="2612379493"/>
       </p:ext>
     </p:extLst>
   </p:cSld>
   <p:clrMap bg1="lt1" tx1="dk1" bg2="lt2" tx2="dk2" accent1="accent1" accent2="accent2" accent3="accent3" accent4="accent4" accent5="accent5" accent6="accent6" hlink="hlink" folHlink="folHlink"/>
   <p:sldLayoutIdLst>
-    <p:sldLayoutId id="2147483649" r:id="rId1"/>
-    <p:sldLayoutId id="2147483650" r:id="rId2"/>
-    <p:sldLayoutId id="2147483651" r:id="rId3"/>
-    <p:sldLayoutId id="2147483652" r:id="rId4"/>
-    <p:sldLayoutId id="2147483653" r:id="rId5"/>
-    <p:sldLayoutId id="2147483654" r:id="rId6"/>
-    <p:sldLayoutId id="2147483655" r:id="rId7"/>
-    <p:sldLayoutId id="2147483656" r:id="rId8"/>
-    <p:sldLayoutId id="2147483657" r:id="rId9"/>
-    <p:sldLayoutId id="2147483658" r:id="rId10"/>
-    <p:sldLayoutId id="2147483659" r:id="rId11"/>
+    <p:sldLayoutId id="2147483697" r:id="rId1"/>
+    <p:sldLayoutId id="2147483698" r:id="rId2"/>
+    <p:sldLayoutId id="2147483699" r:id="rId3"/>
+    <p:sldLayoutId id="2147483700" r:id="rId4"/>
+    <p:sldLayoutId id="2147483701" r:id="rId5"/>
+    <p:sldLayoutId id="2147483702" r:id="rId6"/>
+    <p:sldLayoutId id="2147483703" r:id="rId7"/>
+    <p:sldLayoutId id="2147483704" r:id="rId8"/>
+    <p:sldLayoutId id="2147483705" r:id="rId9"/>
+    <p:sldLayoutId id="2147483706" r:id="rId10"/>
+    <p:sldLayoutId id="2147483707" r:id="rId11"/>
   </p:sldLayoutIdLst>
   <p:txStyles>
     <p:titleStyle>
-      <a:lvl1pPr algn="l" defTabSz="914400" rtl="0" eaLnBrk="1" latinLnBrk="0" hangingPunct="1">
+      <a:lvl1pPr algn="l" defTabSz="243870" rtl="0" eaLnBrk="1" latinLnBrk="0" hangingPunct="1">
         <a:lnSpc>
           <a:spcPct val="90000"/>
         </a:lnSpc>
@@ -2674,7 +2683,7 @@
           <a:spcPct val="0"/>
         </a:spcBef>
         <a:buNone/>
-        <a:defRPr sz="4400" kern="1200">
+        <a:defRPr sz="1173" kern="1200">
           <a:solidFill>
             <a:schemeClr val="tx1"/>
           </a:solidFill>
@@ -2685,16 +2694,16 @@
       </a:lvl1pPr>
     </p:titleStyle>
     <p:bodyStyle>
-      <a:lvl1pPr marL="228600" indent="-228600" algn="l" defTabSz="914400" rtl="0" eaLnBrk="1" latinLnBrk="0" hangingPunct="1">
+      <a:lvl1pPr marL="60968" indent="-60968" algn="l" defTabSz="243870" rtl="0" eaLnBrk="1" latinLnBrk="0" hangingPunct="1">
         <a:lnSpc>
           <a:spcPct val="90000"/>
         </a:lnSpc>
         <a:spcBef>
-          <a:spcPts val="1000"/>
+          <a:spcPts val="267"/>
         </a:spcBef>
         <a:buFont typeface="Arial" panose="020B0604020202020204" pitchFamily="34" charset="0"/>
         <a:buChar char="•"/>
-        <a:defRPr sz="2800" kern="1200">
+        <a:defRPr sz="747" kern="1200">
           <a:solidFill>
             <a:schemeClr val="tx1"/>
           </a:solidFill>
@@ -2703,16 +2712,16 @@
           <a:cs typeface="+mn-cs"/>
         </a:defRPr>
       </a:lvl1pPr>
-      <a:lvl2pPr marL="685800" indent="-228600" algn="l" defTabSz="914400" rtl="0" eaLnBrk="1" latinLnBrk="0" hangingPunct="1">
+      <a:lvl2pPr marL="182903" indent="-60968" algn="l" defTabSz="243870" rtl="0" eaLnBrk="1" latinLnBrk="0" hangingPunct="1">
         <a:lnSpc>
           <a:spcPct val="90000"/>
         </a:lnSpc>
         <a:spcBef>
-          <a:spcPts val="500"/>
+          <a:spcPts val="133"/>
         </a:spcBef>
         <a:buFont typeface="Arial" panose="020B0604020202020204" pitchFamily="34" charset="0"/>
         <a:buChar char="•"/>
-        <a:defRPr sz="2400" kern="1200">
+        <a:defRPr sz="640" kern="1200">
           <a:solidFill>
             <a:schemeClr val="tx1"/>
           </a:solidFill>
@@ -2721,16 +2730,16 @@
           <a:cs typeface="+mn-cs"/>
         </a:defRPr>
       </a:lvl2pPr>
-      <a:lvl3pPr marL="1143000" indent="-228600" algn="l" defTabSz="914400" rtl="0" eaLnBrk="1" latinLnBrk="0" hangingPunct="1">
+      <a:lvl3pPr marL="304838" indent="-60968" algn="l" defTabSz="243870" rtl="0" eaLnBrk="1" latinLnBrk="0" hangingPunct="1">
         <a:lnSpc>
           <a:spcPct val="90000"/>
         </a:lnSpc>
         <a:spcBef>
-          <a:spcPts val="500"/>
+          <a:spcPts val="133"/>
         </a:spcBef>
         <a:buFont typeface="Arial" panose="020B0604020202020204" pitchFamily="34" charset="0"/>
         <a:buChar char="•"/>
-        <a:defRPr sz="2000" kern="1200">
+        <a:defRPr sz="533" kern="1200">
           <a:solidFill>
             <a:schemeClr val="tx1"/>
           </a:solidFill>
@@ -2739,16 +2748,16 @@
           <a:cs typeface="+mn-cs"/>
         </a:defRPr>
       </a:lvl3pPr>
-      <a:lvl4pPr marL="1600200" indent="-228600" algn="l" defTabSz="914400" rtl="0" eaLnBrk="1" latinLnBrk="0" hangingPunct="1">
+      <a:lvl4pPr marL="426773" indent="-60968" algn="l" defTabSz="243870" rtl="0" eaLnBrk="1" latinLnBrk="0" hangingPunct="1">
         <a:lnSpc>
           <a:spcPct val="90000"/>
         </a:lnSpc>
         <a:spcBef>
-          <a:spcPts val="500"/>
+          <a:spcPts val="133"/>
         </a:spcBef>
         <a:buFont typeface="Arial" panose="020B0604020202020204" pitchFamily="34" charset="0"/>
         <a:buChar char="•"/>
-        <a:defRPr sz="1800" kern="1200">
+        <a:defRPr sz="480" kern="1200">
           <a:solidFill>
             <a:schemeClr val="tx1"/>
           </a:solidFill>
@@ -2757,16 +2766,16 @@
           <a:cs typeface="+mn-cs"/>
         </a:defRPr>
       </a:lvl4pPr>
-      <a:lvl5pPr marL="2057400" indent="-228600" algn="l" defTabSz="914400" rtl="0" eaLnBrk="1" latinLnBrk="0" hangingPunct="1">
+      <a:lvl5pPr marL="548709" indent="-60968" algn="l" defTabSz="243870" rtl="0" eaLnBrk="1" latinLnBrk="0" hangingPunct="1">
         <a:lnSpc>
           <a:spcPct val="90000"/>
         </a:lnSpc>
         <a:spcBef>
-          <a:spcPts val="500"/>
+          <a:spcPts val="133"/>
         </a:spcBef>
         <a:buFont typeface="Arial" panose="020B0604020202020204" pitchFamily="34" charset="0"/>
         <a:buChar char="•"/>
-        <a:defRPr sz="1800" kern="1200">
+        <a:defRPr sz="480" kern="1200">
           <a:solidFill>
             <a:schemeClr val="tx1"/>
           </a:solidFill>
@@ -2775,16 +2784,16 @@
           <a:cs typeface="+mn-cs"/>
         </a:defRPr>
       </a:lvl5pPr>
-      <a:lvl6pPr marL="2514600" indent="-228600" algn="l" defTabSz="914400" rtl="0" eaLnBrk="1" latinLnBrk="0" hangingPunct="1">
+      <a:lvl6pPr marL="670644" indent="-60968" algn="l" defTabSz="243870" rtl="0" eaLnBrk="1" latinLnBrk="0" hangingPunct="1">
         <a:lnSpc>
           <a:spcPct val="90000"/>
         </a:lnSpc>
         <a:spcBef>
-          <a:spcPts val="500"/>
+          <a:spcPts val="133"/>
         </a:spcBef>
         <a:buFont typeface="Arial" panose="020B0604020202020204" pitchFamily="34" charset="0"/>
         <a:buChar char="•"/>
-        <a:defRPr sz="1800" kern="1200">
+        <a:defRPr sz="480" kern="1200">
           <a:solidFill>
             <a:schemeClr val="tx1"/>
           </a:solidFill>
@@ -2793,16 +2802,16 @@
           <a:cs typeface="+mn-cs"/>
         </a:defRPr>
       </a:lvl6pPr>
-      <a:lvl7pPr marL="2971800" indent="-228600" algn="l" defTabSz="914400" rtl="0" eaLnBrk="1" latinLnBrk="0" hangingPunct="1">
+      <a:lvl7pPr marL="792579" indent="-60968" algn="l" defTabSz="243870" rtl="0" eaLnBrk="1" latinLnBrk="0" hangingPunct="1">
         <a:lnSpc>
           <a:spcPct val="90000"/>
         </a:lnSpc>
         <a:spcBef>
-          <a:spcPts val="500"/>
+          <a:spcPts val="133"/>
         </a:spcBef>
         <a:buFont typeface="Arial" panose="020B0604020202020204" pitchFamily="34" charset="0"/>
         <a:buChar char="•"/>
-        <a:defRPr sz="1800" kern="1200">
+        <a:defRPr sz="480" kern="1200">
           <a:solidFill>
             <a:schemeClr val="tx1"/>
           </a:solidFill>
@@ -2811,16 +2820,16 @@
           <a:cs typeface="+mn-cs"/>
         </a:defRPr>
       </a:lvl7pPr>
-      <a:lvl8pPr marL="3429000" indent="-228600" algn="l" defTabSz="914400" rtl="0" eaLnBrk="1" latinLnBrk="0" hangingPunct="1">
+      <a:lvl8pPr marL="914514" indent="-60968" algn="l" defTabSz="243870" rtl="0" eaLnBrk="1" latinLnBrk="0" hangingPunct="1">
         <a:lnSpc>
           <a:spcPct val="90000"/>
         </a:lnSpc>
         <a:spcBef>
-          <a:spcPts val="500"/>
+          <a:spcPts val="133"/>
         </a:spcBef>
         <a:buFont typeface="Arial" panose="020B0604020202020204" pitchFamily="34" charset="0"/>
         <a:buChar char="•"/>
-        <a:defRPr sz="1800" kern="1200">
+        <a:defRPr sz="480" kern="1200">
           <a:solidFill>
             <a:schemeClr val="tx1"/>
           </a:solidFill>
@@ -2829,16 +2838,16 @@
           <a:cs typeface="+mn-cs"/>
         </a:defRPr>
       </a:lvl8pPr>
-      <a:lvl9pPr marL="3886200" indent="-228600" algn="l" defTabSz="914400" rtl="0" eaLnBrk="1" latinLnBrk="0" hangingPunct="1">
+      <a:lvl9pPr marL="1036450" indent="-60968" algn="l" defTabSz="243870" rtl="0" eaLnBrk="1" latinLnBrk="0" hangingPunct="1">
         <a:lnSpc>
           <a:spcPct val="90000"/>
         </a:lnSpc>
         <a:spcBef>
-          <a:spcPts val="500"/>
+          <a:spcPts val="133"/>
         </a:spcBef>
         <a:buFont typeface="Arial" panose="020B0604020202020204" pitchFamily="34" charset="0"/>
         <a:buChar char="•"/>
-        <a:defRPr sz="1800" kern="1200">
+        <a:defRPr sz="480" kern="1200">
           <a:solidFill>
             <a:schemeClr val="tx1"/>
           </a:solidFill>
@@ -2852,8 +2861,8 @@
       <a:defPPr>
         <a:defRPr lang="en-US"/>
       </a:defPPr>
-      <a:lvl1pPr marL="0" algn="l" defTabSz="914400" rtl="0" eaLnBrk="1" latinLnBrk="0" hangingPunct="1">
-        <a:defRPr sz="1800" kern="1200">
+      <a:lvl1pPr marL="0" algn="l" defTabSz="243870" rtl="0" eaLnBrk="1" latinLnBrk="0" hangingPunct="1">
+        <a:defRPr sz="480" kern="1200">
           <a:solidFill>
             <a:schemeClr val="tx1"/>
           </a:solidFill>
@@ -2862,8 +2871,8 @@
           <a:cs typeface="+mn-cs"/>
         </a:defRPr>
       </a:lvl1pPr>
-      <a:lvl2pPr marL="457200" algn="l" defTabSz="914400" rtl="0" eaLnBrk="1" latinLnBrk="0" hangingPunct="1">
-        <a:defRPr sz="1800" kern="1200">
+      <a:lvl2pPr marL="121935" algn="l" defTabSz="243870" rtl="0" eaLnBrk="1" latinLnBrk="0" hangingPunct="1">
+        <a:defRPr sz="480" kern="1200">
           <a:solidFill>
             <a:schemeClr val="tx1"/>
           </a:solidFill>
@@ -2872,8 +2881,8 @@
           <a:cs typeface="+mn-cs"/>
         </a:defRPr>
       </a:lvl2pPr>
-      <a:lvl3pPr marL="914400" algn="l" defTabSz="914400" rtl="0" eaLnBrk="1" latinLnBrk="0" hangingPunct="1">
-        <a:defRPr sz="1800" kern="1200">
+      <a:lvl3pPr marL="243870" algn="l" defTabSz="243870" rtl="0" eaLnBrk="1" latinLnBrk="0" hangingPunct="1">
+        <a:defRPr sz="480" kern="1200">
           <a:solidFill>
             <a:schemeClr val="tx1"/>
           </a:solidFill>
@@ -2882,8 +2891,8 @@
           <a:cs typeface="+mn-cs"/>
         </a:defRPr>
       </a:lvl3pPr>
-      <a:lvl4pPr marL="1371600" algn="l" defTabSz="914400" rtl="0" eaLnBrk="1" latinLnBrk="0" hangingPunct="1">
-        <a:defRPr sz="1800" kern="1200">
+      <a:lvl4pPr marL="365806" algn="l" defTabSz="243870" rtl="0" eaLnBrk="1" latinLnBrk="0" hangingPunct="1">
+        <a:defRPr sz="480" kern="1200">
           <a:solidFill>
             <a:schemeClr val="tx1"/>
           </a:solidFill>
@@ -2892,8 +2901,8 @@
           <a:cs typeface="+mn-cs"/>
         </a:defRPr>
       </a:lvl4pPr>
-      <a:lvl5pPr marL="1828800" algn="l" defTabSz="914400" rtl="0" eaLnBrk="1" latinLnBrk="0" hangingPunct="1">
-        <a:defRPr sz="1800" kern="1200">
+      <a:lvl5pPr marL="487741" algn="l" defTabSz="243870" rtl="0" eaLnBrk="1" latinLnBrk="0" hangingPunct="1">
+        <a:defRPr sz="480" kern="1200">
           <a:solidFill>
             <a:schemeClr val="tx1"/>
           </a:solidFill>
@@ -2902,8 +2911,8 @@
           <a:cs typeface="+mn-cs"/>
         </a:defRPr>
       </a:lvl5pPr>
-      <a:lvl6pPr marL="2286000" algn="l" defTabSz="914400" rtl="0" eaLnBrk="1" latinLnBrk="0" hangingPunct="1">
-        <a:defRPr sz="1800" kern="1200">
+      <a:lvl6pPr marL="609676" algn="l" defTabSz="243870" rtl="0" eaLnBrk="1" latinLnBrk="0" hangingPunct="1">
+        <a:defRPr sz="480" kern="1200">
           <a:solidFill>
             <a:schemeClr val="tx1"/>
           </a:solidFill>
@@ -2912,8 +2921,8 @@
           <a:cs typeface="+mn-cs"/>
         </a:defRPr>
       </a:lvl6pPr>
-      <a:lvl7pPr marL="2743200" algn="l" defTabSz="914400" rtl="0" eaLnBrk="1" latinLnBrk="0" hangingPunct="1">
-        <a:defRPr sz="1800" kern="1200">
+      <a:lvl7pPr marL="731611" algn="l" defTabSz="243870" rtl="0" eaLnBrk="1" latinLnBrk="0" hangingPunct="1">
+        <a:defRPr sz="480" kern="1200">
           <a:solidFill>
             <a:schemeClr val="tx1"/>
           </a:solidFill>
@@ -2922,8 +2931,8 @@
           <a:cs typeface="+mn-cs"/>
         </a:defRPr>
       </a:lvl7pPr>
-      <a:lvl8pPr marL="3200400" algn="l" defTabSz="914400" rtl="0" eaLnBrk="1" latinLnBrk="0" hangingPunct="1">
-        <a:defRPr sz="1800" kern="1200">
+      <a:lvl8pPr marL="853547" algn="l" defTabSz="243870" rtl="0" eaLnBrk="1" latinLnBrk="0" hangingPunct="1">
+        <a:defRPr sz="480" kern="1200">
           <a:solidFill>
             <a:schemeClr val="tx1"/>
           </a:solidFill>
@@ -2932,8 +2941,8 @@
           <a:cs typeface="+mn-cs"/>
         </a:defRPr>
       </a:lvl8pPr>
-      <a:lvl9pPr marL="3657600" algn="l" defTabSz="914400" rtl="0" eaLnBrk="1" latinLnBrk="0" hangingPunct="1">
-        <a:defRPr sz="1800" kern="1200">
+      <a:lvl9pPr marL="975482" algn="l" defTabSz="243870" rtl="0" eaLnBrk="1" latinLnBrk="0" hangingPunct="1">
+        <a:defRPr sz="480" kern="1200">
           <a:solidFill>
             <a:schemeClr val="tx1"/>
           </a:solidFill>
@@ -2948,8 +2957,16 @@
 </file>
 
 <file path=ppt/slides/slide1.xml><?xml version="1.0" encoding="utf-8"?>
-<p:sld xmlns:a="http://schemas.openxmlformats.org/drawingml/2006/main" xmlns:r="http://schemas.openxmlformats.org/officeDocument/2006/relationships" xmlns:p="http://schemas.openxmlformats.org/presentationml/2006/main">
+<p:sld xmlns:a="http://schemas.openxmlformats.org/drawingml/2006/main" xmlns:r="http://schemas.openxmlformats.org/officeDocument/2006/relationships" xmlns:p="http://schemas.openxmlformats.org/presentationml/2006/main" showMasterSp="0">
   <p:cSld>
+    <p:bg>
+      <p:bgPr>
+        <a:solidFill>
+          <a:schemeClr val="bg1"/>
+        </a:solidFill>
+        <a:effectLst/>
+      </p:bgPr>
+    </p:bg>
     <p:spTree>
       <p:nvGrpSpPr>
         <p:cNvPr id="1" name=""/>
@@ -2972,8 +2989,8 @@
         </p:nvSpPr>
         <p:spPr>
           <a:xfrm>
-            <a:off x="2322951" y="2474038"/>
-            <a:ext cx="7318314" cy="1066800"/>
+            <a:off x="618263" y="502979"/>
+            <a:ext cx="5488736" cy="800100"/>
           </a:xfrm>
           <a:prstGeom prst="rect">
             <a:avLst/>
@@ -2998,7 +3015,7 @@
           <a:lstStyle/>
           <a:p>
             <a:pPr algn="ctr"/>
-            <a:endParaRPr lang="en-US"/>
+            <a:endParaRPr lang="en-US" sz="1350"/>
           </a:p>
         </p:txBody>
       </p:sp>
@@ -3010,8 +3027,8 @@
         </p:nvSpPr>
         <p:spPr>
           <a:xfrm>
-            <a:off x="6552447" y="2180906"/>
-            <a:ext cx="418704" cy="369332"/>
+            <a:off x="3790385" y="283129"/>
+            <a:ext cx="360996" cy="300082"/>
           </a:xfrm>
           <a:prstGeom prst="rect">
             <a:avLst/>
@@ -3025,7 +3042,7 @@
           <a:lstStyle/>
           <a:p>
             <a:r>
-              <a:rPr lang="en-US" dirty="0"/>
+              <a:rPr lang="en-US" sz="1350" dirty="0"/>
               <a:t>12</a:t>
             </a:r>
           </a:p>
@@ -3039,8 +3056,8 @@
         </p:nvSpPr>
         <p:spPr>
           <a:xfrm>
-            <a:off x="2209047" y="2180906"/>
-            <a:ext cx="418704" cy="369332"/>
+            <a:off x="532835" y="283129"/>
+            <a:ext cx="360996" cy="300082"/>
           </a:xfrm>
           <a:prstGeom prst="rect">
             <a:avLst/>
@@ -3054,7 +3071,7 @@
           <a:lstStyle/>
           <a:p>
             <a:r>
-              <a:rPr lang="en-US" dirty="0"/>
+              <a:rPr lang="en-US" sz="1350" dirty="0"/>
               <a:t>31</a:t>
             </a:r>
           </a:p>
@@ -3068,8 +3085,8 @@
         </p:nvSpPr>
         <p:spPr>
           <a:xfrm>
-            <a:off x="9561951" y="2180906"/>
-            <a:ext cx="301686" cy="369332"/>
+            <a:off x="6047513" y="283129"/>
+            <a:ext cx="272832" cy="300082"/>
           </a:xfrm>
           <a:prstGeom prst="rect">
             <a:avLst/>
@@ -3083,7 +3100,7 @@
           <a:lstStyle/>
           <a:p>
             <a:r>
-              <a:rPr lang="en-US" dirty="0"/>
+              <a:rPr lang="en-US" sz="1350" dirty="0"/>
               <a:t>0</a:t>
             </a:r>
           </a:p>
@@ -3097,8 +3114,8 @@
         </p:nvCxnSpPr>
         <p:spPr>
           <a:xfrm>
-            <a:off x="6907678" y="2321639"/>
-            <a:ext cx="0" cy="1371600"/>
+            <a:off x="4056809" y="388679"/>
+            <a:ext cx="0" cy="1028700"/>
           </a:xfrm>
           <a:prstGeom prst="line">
             <a:avLst/>
@@ -3130,8 +3147,8 @@
         </p:nvCxnSpPr>
         <p:spPr>
           <a:xfrm>
-            <a:off x="7528870" y="2321639"/>
-            <a:ext cx="0" cy="1371600"/>
+            <a:off x="4522703" y="388679"/>
+            <a:ext cx="0" cy="1028700"/>
           </a:xfrm>
           <a:prstGeom prst="line">
             <a:avLst/>
@@ -3163,8 +3180,8 @@
         </p:nvSpPr>
         <p:spPr>
           <a:xfrm>
-            <a:off x="8041065" y="2180906"/>
-            <a:ext cx="301686" cy="369332"/>
+            <a:off x="4906849" y="283129"/>
+            <a:ext cx="272832" cy="300082"/>
           </a:xfrm>
           <a:prstGeom prst="rect">
             <a:avLst/>
@@ -3178,7 +3195,7 @@
           <a:lstStyle/>
           <a:p>
             <a:r>
-              <a:rPr lang="en-US" dirty="0"/>
+              <a:rPr lang="en-US" sz="1350" dirty="0"/>
               <a:t>6</a:t>
             </a:r>
           </a:p>
@@ -3192,8 +3209,8 @@
         </p:nvCxnSpPr>
         <p:spPr>
           <a:xfrm>
-            <a:off x="8269665" y="2333306"/>
-            <a:ext cx="0" cy="1371600"/>
+            <a:off x="5078299" y="397430"/>
+            <a:ext cx="0" cy="1028700"/>
           </a:xfrm>
           <a:prstGeom prst="line">
             <a:avLst/>
@@ -3225,8 +3242,8 @@
         </p:nvSpPr>
         <p:spPr>
           <a:xfrm>
-            <a:off x="6834854" y="2525074"/>
-            <a:ext cx="1387303" cy="338554"/>
+            <a:off x="4002190" y="541260"/>
+            <a:ext cx="1089850" cy="276999"/>
           </a:xfrm>
           <a:prstGeom prst="rect">
             <a:avLst/>
@@ -3240,7 +3257,7 @@
           <a:lstStyle/>
           <a:p>
             <a:r>
-              <a:rPr lang="en-US" sz="1600" dirty="0"/>
+              <a:rPr lang="en-US" sz="1200" dirty="0"/>
               <a:t>  L2 cache-sets</a:t>
             </a:r>
           </a:p>
@@ -3254,8 +3271,8 @@
         </p:nvCxnSpPr>
         <p:spPr>
           <a:xfrm>
-            <a:off x="6152882" y="2853352"/>
-            <a:ext cx="2121103" cy="0"/>
+            <a:off x="3490716" y="787464"/>
+            <a:ext cx="1590827" cy="0"/>
           </a:xfrm>
           <a:prstGeom prst="straightConnector1">
             <a:avLst/>
@@ -3288,8 +3305,8 @@
         </p:nvCxnSpPr>
         <p:spPr>
           <a:xfrm>
-            <a:off x="6148562" y="2321639"/>
-            <a:ext cx="0" cy="1371600"/>
+            <a:off x="3487472" y="388679"/>
+            <a:ext cx="0" cy="1028700"/>
           </a:xfrm>
           <a:prstGeom prst="line">
             <a:avLst/>
@@ -3321,8 +3338,8 @@
         </p:nvSpPr>
         <p:spPr>
           <a:xfrm>
-            <a:off x="5783174" y="2192573"/>
-            <a:ext cx="418704" cy="369332"/>
+            <a:off x="3213431" y="291880"/>
+            <a:ext cx="360996" cy="300082"/>
           </a:xfrm>
           <a:prstGeom prst="rect">
             <a:avLst/>
@@ -3336,7 +3353,7 @@
           <a:lstStyle/>
           <a:p>
             <a:r>
-              <a:rPr lang="en-US" dirty="0"/>
+              <a:rPr lang="en-US" sz="1350" dirty="0"/>
               <a:t>15</a:t>
             </a:r>
           </a:p>
@@ -3350,8 +3367,8 @@
         </p:nvCxnSpPr>
         <p:spPr>
           <a:xfrm flipV="1">
-            <a:off x="6906410" y="3324230"/>
-            <a:ext cx="1362989" cy="3935"/>
+            <a:off x="4055858" y="1140627"/>
+            <a:ext cx="1022242" cy="2951"/>
           </a:xfrm>
           <a:prstGeom prst="straightConnector1">
             <a:avLst/>
@@ -3384,8 +3401,8 @@
         </p:nvSpPr>
         <p:spPr>
           <a:xfrm>
-            <a:off x="6802932" y="3011364"/>
-            <a:ext cx="1513941" cy="338554"/>
+            <a:off x="3978254" y="905978"/>
+            <a:ext cx="1184427" cy="276999"/>
           </a:xfrm>
           <a:prstGeom prst="rect">
             <a:avLst/>
@@ -3399,7 +3416,7 @@
           <a:lstStyle/>
           <a:p>
             <a:r>
-              <a:rPr lang="en-US" sz="1600" dirty="0"/>
+              <a:rPr lang="en-US" sz="1200" dirty="0"/>
               <a:t>  L1D cache-sets</a:t>
             </a:r>
           </a:p>
@@ -3421,7 +3438,7 @@
 <file path=ppt/theme/theme1.xml><?xml version="1.0" encoding="utf-8"?>
 <a:theme xmlns:a="http://schemas.openxmlformats.org/drawingml/2006/main" name="Office Theme">
   <a:themeElements>
-    <a:clrScheme name="Office">
+    <a:clrScheme name="Office Theme">
       <a:dk1>
         <a:sysClr val="windowText" lastClr="000000"/>
       </a:dk1>
@@ -3459,7 +3476,7 @@
         <a:srgbClr val="954F72"/>
       </a:folHlink>
     </a:clrScheme>
-    <a:fontScheme name="Office">
+    <a:fontScheme name="Office Theme">
       <a:majorFont>
         <a:latin typeface="Calibri Light" panose="020F0302020204030204"/>
         <a:ea typeface=""/>
@@ -3494,23 +3511,6 @@
         <a:font script="Viet" typeface="Times New Roman"/>
         <a:font script="Uigh" typeface="Microsoft Uighur"/>
         <a:font script="Geor" typeface="Sylfaen"/>
-        <a:font script="Armn" typeface="Arial"/>
-        <a:font script="Bugi" typeface="Leelawadee UI"/>
-        <a:font script="Bopo" typeface="Microsoft JhengHei"/>
-        <a:font script="Java" typeface="Javanese Text"/>
-        <a:font script="Lisu" typeface="Segoe UI"/>
-        <a:font script="Mymr" typeface="Myanmar Text"/>
-        <a:font script="Nkoo" typeface="Ebrima"/>
-        <a:font script="Olck" typeface="Nirmala UI"/>
-        <a:font script="Osma" typeface="Ebrima"/>
-        <a:font script="Phag" typeface="Phagspa"/>
-        <a:font script="Syrn" typeface="Estrangelo Edessa"/>
-        <a:font script="Syrj" typeface="Estrangelo Edessa"/>
-        <a:font script="Syre" typeface="Estrangelo Edessa"/>
-        <a:font script="Sora" typeface="Nirmala UI"/>
-        <a:font script="Tale" typeface="Microsoft Tai Le"/>
-        <a:font script="Talu" typeface="Microsoft New Tai Lue"/>
-        <a:font script="Tfng" typeface="Ebrima"/>
       </a:majorFont>
       <a:minorFont>
         <a:latin typeface="Calibri" panose="020F0502020204030204"/>
@@ -3546,26 +3546,9 @@
         <a:font script="Viet" typeface="Arial"/>
         <a:font script="Uigh" typeface="Microsoft Uighur"/>
         <a:font script="Geor" typeface="Sylfaen"/>
-        <a:font script="Armn" typeface="Arial"/>
-        <a:font script="Bugi" typeface="Leelawadee UI"/>
-        <a:font script="Bopo" typeface="Microsoft JhengHei"/>
-        <a:font script="Java" typeface="Javanese Text"/>
-        <a:font script="Lisu" typeface="Segoe UI"/>
-        <a:font script="Mymr" typeface="Myanmar Text"/>
-        <a:font script="Nkoo" typeface="Ebrima"/>
-        <a:font script="Olck" typeface="Nirmala UI"/>
-        <a:font script="Osma" typeface="Ebrima"/>
-        <a:font script="Phag" typeface="Phagspa"/>
-        <a:font script="Syrn" typeface="Estrangelo Edessa"/>
-        <a:font script="Syrj" typeface="Estrangelo Edessa"/>
-        <a:font script="Syre" typeface="Estrangelo Edessa"/>
-        <a:font script="Sora" typeface="Nirmala UI"/>
-        <a:font script="Tale" typeface="Microsoft Tai Le"/>
-        <a:font script="Talu" typeface="Microsoft New Tai Lue"/>
-        <a:font script="Tfng" typeface="Ebrima"/>
       </a:minorFont>
     </a:fontScheme>
-    <a:fmtScheme name="Office">
+    <a:fmtScheme name="Office Theme">
       <a:fillStyleLst>
         <a:solidFill>
           <a:schemeClr val="phClr"/>

</xml_diff>

<commit_message>
Update cache mapping and relevant section
</commit_message>
<xml_diff>
--- a/paper/figs/cache-mapping.pptx
+++ b/paper/figs/cache-mapping.pptx
@@ -243,7 +243,7 @@
           <a:p>
             <a:fld id="{9EB2880A-EEE5-43D5-A408-71252EF6C5A2}" type="datetimeFigureOut">
               <a:rPr lang="en-US" smtClean="0"/>
-              <a:t>1/20/2018</a:t>
+              <a:t>1/24/2018</a:t>
             </a:fld>
             <a:endParaRPr lang="en-US"/>
           </a:p>
@@ -413,7 +413,7 @@
           <a:p>
             <a:fld id="{9EB2880A-EEE5-43D5-A408-71252EF6C5A2}" type="datetimeFigureOut">
               <a:rPr lang="en-US" smtClean="0"/>
-              <a:t>1/20/2018</a:t>
+              <a:t>1/24/2018</a:t>
             </a:fld>
             <a:endParaRPr lang="en-US"/>
           </a:p>
@@ -593,7 +593,7 @@
           <a:p>
             <a:fld id="{9EB2880A-EEE5-43D5-A408-71252EF6C5A2}" type="datetimeFigureOut">
               <a:rPr lang="en-US" smtClean="0"/>
-              <a:t>1/20/2018</a:t>
+              <a:t>1/24/2018</a:t>
             </a:fld>
             <a:endParaRPr lang="en-US"/>
           </a:p>
@@ -763,7 +763,7 @@
           <a:p>
             <a:fld id="{9EB2880A-EEE5-43D5-A408-71252EF6C5A2}" type="datetimeFigureOut">
               <a:rPr lang="en-US" smtClean="0"/>
-              <a:t>1/20/2018</a:t>
+              <a:t>1/24/2018</a:t>
             </a:fld>
             <a:endParaRPr lang="en-US"/>
           </a:p>
@@ -1009,7 +1009,7 @@
           <a:p>
             <a:fld id="{9EB2880A-EEE5-43D5-A408-71252EF6C5A2}" type="datetimeFigureOut">
               <a:rPr lang="en-US" smtClean="0"/>
-              <a:t>1/20/2018</a:t>
+              <a:t>1/24/2018</a:t>
             </a:fld>
             <a:endParaRPr lang="en-US"/>
           </a:p>
@@ -1241,7 +1241,7 @@
           <a:p>
             <a:fld id="{9EB2880A-EEE5-43D5-A408-71252EF6C5A2}" type="datetimeFigureOut">
               <a:rPr lang="en-US" smtClean="0"/>
-              <a:t>1/20/2018</a:t>
+              <a:t>1/24/2018</a:t>
             </a:fld>
             <a:endParaRPr lang="en-US"/>
           </a:p>
@@ -1608,7 +1608,7 @@
           <a:p>
             <a:fld id="{9EB2880A-EEE5-43D5-A408-71252EF6C5A2}" type="datetimeFigureOut">
               <a:rPr lang="en-US" smtClean="0"/>
-              <a:t>1/20/2018</a:t>
+              <a:t>1/24/2018</a:t>
             </a:fld>
             <a:endParaRPr lang="en-US"/>
           </a:p>
@@ -1726,7 +1726,7 @@
           <a:p>
             <a:fld id="{9EB2880A-EEE5-43D5-A408-71252EF6C5A2}" type="datetimeFigureOut">
               <a:rPr lang="en-US" smtClean="0"/>
-              <a:t>1/20/2018</a:t>
+              <a:t>1/24/2018</a:t>
             </a:fld>
             <a:endParaRPr lang="en-US"/>
           </a:p>
@@ -1821,7 +1821,7 @@
           <a:p>
             <a:fld id="{9EB2880A-EEE5-43D5-A408-71252EF6C5A2}" type="datetimeFigureOut">
               <a:rPr lang="en-US" smtClean="0"/>
-              <a:t>1/20/2018</a:t>
+              <a:t>1/24/2018</a:t>
             </a:fld>
             <a:endParaRPr lang="en-US"/>
           </a:p>
@@ -2098,7 +2098,7 @@
           <a:p>
             <a:fld id="{9EB2880A-EEE5-43D5-A408-71252EF6C5A2}" type="datetimeFigureOut">
               <a:rPr lang="en-US" smtClean="0"/>
-              <a:t>1/20/2018</a:t>
+              <a:t>1/24/2018</a:t>
             </a:fld>
             <a:endParaRPr lang="en-US"/>
           </a:p>
@@ -2355,7 +2355,7 @@
           <a:p>
             <a:fld id="{9EB2880A-EEE5-43D5-A408-71252EF6C5A2}" type="datetimeFigureOut">
               <a:rPr lang="en-US" smtClean="0"/>
-              <a:t>1/20/2018</a:t>
+              <a:t>1/24/2018</a:t>
             </a:fld>
             <a:endParaRPr lang="en-US"/>
           </a:p>
@@ -2568,7 +2568,7 @@
           <a:p>
             <a:fld id="{9EB2880A-EEE5-43D5-A408-71252EF6C5A2}" type="datetimeFigureOut">
               <a:rPr lang="en-US" smtClean="0"/>
-              <a:t>1/20/2018</a:t>
+              <a:t>1/24/2018</a:t>
             </a:fld>
             <a:endParaRPr lang="en-US"/>
           </a:p>
@@ -3043,7 +3043,7 @@
           <a:p>
             <a:r>
               <a:rPr lang="en-US" sz="1350" dirty="0"/>
-              <a:t>12</a:t>
+              <a:t>13</a:t>
             </a:r>
           </a:p>
         </p:txBody>

</xml_diff>

<commit_message>
Update cache mapping figure
Added page sets and bits used for partitioning
</commit_message>
<xml_diff>
--- a/paper/figs/cache-mapping.pptx
+++ b/paper/figs/cache-mapping.pptx
@@ -243,7 +243,7 @@
           <a:p>
             <a:fld id="{9EB2880A-EEE5-43D5-A408-71252EF6C5A2}" type="datetimeFigureOut">
               <a:rPr lang="en-US" smtClean="0"/>
-              <a:t>1/24/2018</a:t>
+              <a:t>1/26/2018</a:t>
             </a:fld>
             <a:endParaRPr lang="en-US"/>
           </a:p>
@@ -413,7 +413,7 @@
           <a:p>
             <a:fld id="{9EB2880A-EEE5-43D5-A408-71252EF6C5A2}" type="datetimeFigureOut">
               <a:rPr lang="en-US" smtClean="0"/>
-              <a:t>1/24/2018</a:t>
+              <a:t>1/26/2018</a:t>
             </a:fld>
             <a:endParaRPr lang="en-US"/>
           </a:p>
@@ -593,7 +593,7 @@
           <a:p>
             <a:fld id="{9EB2880A-EEE5-43D5-A408-71252EF6C5A2}" type="datetimeFigureOut">
               <a:rPr lang="en-US" smtClean="0"/>
-              <a:t>1/24/2018</a:t>
+              <a:t>1/26/2018</a:t>
             </a:fld>
             <a:endParaRPr lang="en-US"/>
           </a:p>
@@ -763,7 +763,7 @@
           <a:p>
             <a:fld id="{9EB2880A-EEE5-43D5-A408-71252EF6C5A2}" type="datetimeFigureOut">
               <a:rPr lang="en-US" smtClean="0"/>
-              <a:t>1/24/2018</a:t>
+              <a:t>1/26/2018</a:t>
             </a:fld>
             <a:endParaRPr lang="en-US"/>
           </a:p>
@@ -1009,7 +1009,7 @@
           <a:p>
             <a:fld id="{9EB2880A-EEE5-43D5-A408-71252EF6C5A2}" type="datetimeFigureOut">
               <a:rPr lang="en-US" smtClean="0"/>
-              <a:t>1/24/2018</a:t>
+              <a:t>1/26/2018</a:t>
             </a:fld>
             <a:endParaRPr lang="en-US"/>
           </a:p>
@@ -1241,7 +1241,7 @@
           <a:p>
             <a:fld id="{9EB2880A-EEE5-43D5-A408-71252EF6C5A2}" type="datetimeFigureOut">
               <a:rPr lang="en-US" smtClean="0"/>
-              <a:t>1/24/2018</a:t>
+              <a:t>1/26/2018</a:t>
             </a:fld>
             <a:endParaRPr lang="en-US"/>
           </a:p>
@@ -1608,7 +1608,7 @@
           <a:p>
             <a:fld id="{9EB2880A-EEE5-43D5-A408-71252EF6C5A2}" type="datetimeFigureOut">
               <a:rPr lang="en-US" smtClean="0"/>
-              <a:t>1/24/2018</a:t>
+              <a:t>1/26/2018</a:t>
             </a:fld>
             <a:endParaRPr lang="en-US"/>
           </a:p>
@@ -1726,7 +1726,7 @@
           <a:p>
             <a:fld id="{9EB2880A-EEE5-43D5-A408-71252EF6C5A2}" type="datetimeFigureOut">
               <a:rPr lang="en-US" smtClean="0"/>
-              <a:t>1/24/2018</a:t>
+              <a:t>1/26/2018</a:t>
             </a:fld>
             <a:endParaRPr lang="en-US"/>
           </a:p>
@@ -1821,7 +1821,7 @@
           <a:p>
             <a:fld id="{9EB2880A-EEE5-43D5-A408-71252EF6C5A2}" type="datetimeFigureOut">
               <a:rPr lang="en-US" smtClean="0"/>
-              <a:t>1/24/2018</a:t>
+              <a:t>1/26/2018</a:t>
             </a:fld>
             <a:endParaRPr lang="en-US"/>
           </a:p>
@@ -2098,7 +2098,7 @@
           <a:p>
             <a:fld id="{9EB2880A-EEE5-43D5-A408-71252EF6C5A2}" type="datetimeFigureOut">
               <a:rPr lang="en-US" smtClean="0"/>
-              <a:t>1/24/2018</a:t>
+              <a:t>1/26/2018</a:t>
             </a:fld>
             <a:endParaRPr lang="en-US"/>
           </a:p>
@@ -2355,7 +2355,7 @@
           <a:p>
             <a:fld id="{9EB2880A-EEE5-43D5-A408-71252EF6C5A2}" type="datetimeFigureOut">
               <a:rPr lang="en-US" smtClean="0"/>
-              <a:t>1/24/2018</a:t>
+              <a:t>1/26/2018</a:t>
             </a:fld>
             <a:endParaRPr lang="en-US"/>
           </a:p>
@@ -2568,7 +2568,7 @@
           <a:p>
             <a:fld id="{9EB2880A-EEE5-43D5-A408-71252EF6C5A2}" type="datetimeFigureOut">
               <a:rPr lang="en-US" smtClean="0"/>
-              <a:t>1/24/2018</a:t>
+              <a:t>1/26/2018</a:t>
             </a:fld>
             <a:endParaRPr lang="en-US"/>
           </a:p>
@@ -3139,15 +3139,44 @@
           </a:fontRef>
         </p:style>
       </p:cxnSp>
+      <p:sp>
+        <p:nvSpPr>
+          <p:cNvPr id="10" name="TextBox 9"/>
+          <p:cNvSpPr txBox="1"/>
+          <p:nvPr/>
+        </p:nvSpPr>
+        <p:spPr>
+          <a:xfrm>
+            <a:off x="4889607" y="284553"/>
+            <a:ext cx="272832" cy="300082"/>
+          </a:xfrm>
+          <a:prstGeom prst="rect">
+            <a:avLst/>
+          </a:prstGeom>
+          <a:noFill/>
+        </p:spPr>
+        <p:txBody>
+          <a:bodyPr wrap="none" rtlCol="0">
+            <a:spAutoFit/>
+          </a:bodyPr>
+          <a:lstStyle/>
+          <a:p>
+            <a:r>
+              <a:rPr lang="en-US" sz="1350" dirty="0"/>
+              <a:t>6</a:t>
+            </a:r>
+          </a:p>
+        </p:txBody>
+      </p:sp>
       <p:cxnSp>
         <p:nvCxnSpPr>
-          <p:cNvPr id="9" name="Straight Connector 8"/>
+          <p:cNvPr id="11" name="Straight Connector 10"/>
           <p:cNvCxnSpPr/>
           <p:nvPr/>
         </p:nvCxnSpPr>
         <p:spPr>
           <a:xfrm>
-            <a:off x="4522703" y="388679"/>
+            <a:off x="5078299" y="397430"/>
             <a:ext cx="0" cy="1028700"/>
           </a:xfrm>
           <a:prstGeom prst="line">
@@ -3174,14 +3203,14 @@
       </p:cxnSp>
       <p:sp>
         <p:nvSpPr>
-          <p:cNvPr id="10" name="TextBox 9"/>
+          <p:cNvPr id="12" name="TextBox 11"/>
           <p:cNvSpPr txBox="1"/>
           <p:nvPr/>
         </p:nvSpPr>
         <p:spPr>
           <a:xfrm>
-            <a:off x="4906849" y="283129"/>
-            <a:ext cx="272832" cy="300082"/>
+            <a:off x="3487472" y="619572"/>
+            <a:ext cx="1011815" cy="261610"/>
           </a:xfrm>
           <a:prstGeom prst="rect">
             <a:avLst/>
@@ -3195,69 +3224,7 @@
           <a:lstStyle/>
           <a:p>
             <a:r>
-              <a:rPr lang="en-US" sz="1350" dirty="0"/>
-              <a:t>6</a:t>
-            </a:r>
-          </a:p>
-        </p:txBody>
-      </p:sp>
-      <p:cxnSp>
-        <p:nvCxnSpPr>
-          <p:cNvPr id="11" name="Straight Connector 10"/>
-          <p:cNvCxnSpPr/>
-          <p:nvPr/>
-        </p:nvCxnSpPr>
-        <p:spPr>
-          <a:xfrm>
-            <a:off x="5078299" y="397430"/>
-            <a:ext cx="0" cy="1028700"/>
-          </a:xfrm>
-          <a:prstGeom prst="line">
-            <a:avLst/>
-          </a:prstGeom>
-          <a:ln w="6350">
-            <a:prstDash val="dash"/>
-          </a:ln>
-        </p:spPr>
-        <p:style>
-          <a:lnRef idx="3">
-            <a:schemeClr val="dk1"/>
-          </a:lnRef>
-          <a:fillRef idx="0">
-            <a:schemeClr val="dk1"/>
-          </a:fillRef>
-          <a:effectRef idx="2">
-            <a:schemeClr val="dk1"/>
-          </a:effectRef>
-          <a:fontRef idx="minor">
-            <a:schemeClr val="tx1"/>
-          </a:fontRef>
-        </p:style>
-      </p:cxnSp>
-      <p:sp>
-        <p:nvSpPr>
-          <p:cNvPr id="12" name="TextBox 11"/>
-          <p:cNvSpPr txBox="1"/>
-          <p:nvPr/>
-        </p:nvSpPr>
-        <p:spPr>
-          <a:xfrm>
-            <a:off x="4002190" y="541260"/>
-            <a:ext cx="1089850" cy="276999"/>
-          </a:xfrm>
-          <a:prstGeom prst="rect">
-            <a:avLst/>
-          </a:prstGeom>
-          <a:noFill/>
-        </p:spPr>
-        <p:txBody>
-          <a:bodyPr wrap="none" rtlCol="0">
-            <a:spAutoFit/>
-          </a:bodyPr>
-          <a:lstStyle/>
-          <a:p>
-            <a:r>
-              <a:rPr lang="en-US" sz="1200" dirty="0"/>
+              <a:rPr lang="en-US" sz="1100" dirty="0"/>
               <a:t>  L2 cache-sets</a:t>
             </a:r>
           </a:p>
@@ -3271,7 +3238,7 @@
         </p:nvCxnSpPr>
         <p:spPr>
           <a:xfrm>
-            <a:off x="3490716" y="787464"/>
+            <a:off x="3488590" y="846644"/>
             <a:ext cx="1590827" cy="0"/>
           </a:xfrm>
           <a:prstGeom prst="straightConnector1">
@@ -3367,7 +3334,7 @@
         </p:nvCxnSpPr>
         <p:spPr>
           <a:xfrm flipV="1">
-            <a:off x="4055858" y="1140627"/>
+            <a:off x="4058281" y="1089330"/>
             <a:ext cx="1022242" cy="2951"/>
           </a:xfrm>
           <a:prstGeom prst="straightConnector1">
@@ -3401,8 +3368,8 @@
         </p:nvSpPr>
         <p:spPr>
           <a:xfrm>
-            <a:off x="3978254" y="905978"/>
-            <a:ext cx="1184427" cy="276999"/>
+            <a:off x="4000065" y="868132"/>
+            <a:ext cx="1186592" cy="261610"/>
           </a:xfrm>
           <a:prstGeom prst="rect">
             <a:avLst/>
@@ -3410,14 +3377,202 @@
           <a:noFill/>
         </p:spPr>
         <p:txBody>
+          <a:bodyPr wrap="square" rtlCol="0">
+            <a:spAutoFit/>
+          </a:bodyPr>
+          <a:lstStyle/>
+          <a:p>
+            <a:r>
+              <a:rPr lang="en-US" sz="1100" dirty="0"/>
+              <a:t>  L1D cache-sets</a:t>
+            </a:r>
+          </a:p>
+        </p:txBody>
+      </p:sp>
+      <p:cxnSp>
+        <p:nvCxnSpPr>
+          <p:cNvPr id="18" name="Straight Arrow Connector 17"/>
+          <p:cNvCxnSpPr/>
+          <p:nvPr/>
+        </p:nvCxnSpPr>
+        <p:spPr>
+          <a:xfrm>
+            <a:off x="4284004" y="590802"/>
+            <a:ext cx="1822995" cy="5373"/>
+          </a:xfrm>
+          <a:prstGeom prst="straightConnector1">
+            <a:avLst/>
+          </a:prstGeom>
+          <a:ln w="12700" cap="rnd">
+            <a:headEnd type="arrow"/>
+            <a:tailEnd type="arrow"/>
+          </a:ln>
+        </p:spPr>
+        <p:style>
+          <a:lnRef idx="2">
+            <a:schemeClr val="dk1"/>
+          </a:lnRef>
+          <a:fillRef idx="0">
+            <a:schemeClr val="dk1"/>
+          </a:fillRef>
+          <a:effectRef idx="1">
+            <a:schemeClr val="dk1"/>
+          </a:effectRef>
+          <a:fontRef idx="minor">
+            <a:schemeClr val="tx1"/>
+          </a:fontRef>
+        </p:style>
+      </p:cxnSp>
+      <p:sp>
+        <p:nvSpPr>
+          <p:cNvPr id="19" name="TextBox 18"/>
+          <p:cNvSpPr txBox="1"/>
+          <p:nvPr/>
+        </p:nvSpPr>
+        <p:spPr>
+          <a:xfrm>
+            <a:off x="4254537" y="367956"/>
+            <a:ext cx="1186592" cy="261610"/>
+          </a:xfrm>
+          <a:prstGeom prst="rect">
+            <a:avLst/>
+          </a:prstGeom>
+          <a:noFill/>
+        </p:spPr>
+        <p:txBody>
+          <a:bodyPr wrap="square" rtlCol="0">
+            <a:spAutoFit/>
+          </a:bodyPr>
+          <a:lstStyle/>
+          <a:p>
+            <a:r>
+              <a:rPr lang="en-US" sz="1100" dirty="0"/>
+              <a:t>  Page sets</a:t>
+            </a:r>
+          </a:p>
+        </p:txBody>
+      </p:sp>
+      <p:sp>
+        <p:nvSpPr>
+          <p:cNvPr id="20" name="TextBox 19"/>
+          <p:cNvSpPr txBox="1"/>
+          <p:nvPr/>
+        </p:nvSpPr>
+        <p:spPr>
+          <a:xfrm>
+            <a:off x="4021574" y="282256"/>
+            <a:ext cx="360996" cy="300082"/>
+          </a:xfrm>
+          <a:prstGeom prst="rect">
+            <a:avLst/>
+          </a:prstGeom>
+          <a:noFill/>
+        </p:spPr>
+        <p:txBody>
           <a:bodyPr wrap="none" rtlCol="0">
             <a:spAutoFit/>
           </a:bodyPr>
           <a:lstStyle/>
           <a:p>
             <a:r>
+              <a:rPr lang="en-US" sz="1350" dirty="0"/>
+              <a:t>12</a:t>
+            </a:r>
+          </a:p>
+        </p:txBody>
+      </p:sp>
+      <p:cxnSp>
+        <p:nvCxnSpPr>
+          <p:cNvPr id="21" name="Straight Connector 20"/>
+          <p:cNvCxnSpPr/>
+          <p:nvPr/>
+        </p:nvCxnSpPr>
+        <p:spPr>
+          <a:xfrm>
+            <a:off x="4287998" y="387806"/>
+            <a:ext cx="0" cy="1028700"/>
+          </a:xfrm>
+          <a:prstGeom prst="line">
+            <a:avLst/>
+          </a:prstGeom>
+          <a:ln w="6350">
+            <a:prstDash val="dash"/>
+          </a:ln>
+        </p:spPr>
+        <p:style>
+          <a:lnRef idx="3">
+            <a:schemeClr val="dk1"/>
+          </a:lnRef>
+          <a:fillRef idx="0">
+            <a:schemeClr val="dk1"/>
+          </a:fillRef>
+          <a:effectRef idx="2">
+            <a:schemeClr val="dk1"/>
+          </a:effectRef>
+          <a:fontRef idx="minor">
+            <a:schemeClr val="tx1"/>
+          </a:fontRef>
+        </p:style>
+      </p:cxnSp>
+      <p:cxnSp>
+        <p:nvCxnSpPr>
+          <p:cNvPr id="23" name="Straight Arrow Connector 22"/>
+          <p:cNvCxnSpPr/>
+          <p:nvPr/>
+        </p:nvCxnSpPr>
+        <p:spPr>
+          <a:xfrm flipV="1">
+            <a:off x="3479724" y="1197830"/>
+            <a:ext cx="806277" cy="422"/>
+          </a:xfrm>
+          <a:prstGeom prst="straightConnector1">
+            <a:avLst/>
+          </a:prstGeom>
+          <a:ln w="12700" cap="rnd">
+            <a:headEnd type="arrow"/>
+            <a:tailEnd type="arrow"/>
+          </a:ln>
+        </p:spPr>
+        <p:style>
+          <a:lnRef idx="2">
+            <a:schemeClr val="dk1"/>
+          </a:lnRef>
+          <a:fillRef idx="0">
+            <a:schemeClr val="dk1"/>
+          </a:fillRef>
+          <a:effectRef idx="1">
+            <a:schemeClr val="dk1"/>
+          </a:effectRef>
+          <a:fontRef idx="minor">
+            <a:schemeClr val="tx1"/>
+          </a:fontRef>
+        </p:style>
+      </p:cxnSp>
+      <p:sp>
+        <p:nvSpPr>
+          <p:cNvPr id="24" name="TextBox 23"/>
+          <p:cNvSpPr txBox="1"/>
+          <p:nvPr/>
+        </p:nvSpPr>
+        <p:spPr>
+          <a:xfrm>
+            <a:off x="3406769" y="1183530"/>
+            <a:ext cx="1186592" cy="276999"/>
+          </a:xfrm>
+          <a:prstGeom prst="rect">
+            <a:avLst/>
+          </a:prstGeom>
+          <a:noFill/>
+        </p:spPr>
+        <p:txBody>
+          <a:bodyPr wrap="square" rtlCol="0">
+            <a:spAutoFit/>
+          </a:bodyPr>
+          <a:lstStyle/>
+          <a:p>
+            <a:r>
               <a:rPr lang="en-US" sz="1200" dirty="0"/>
-              <a:t>  L1D cache-sets</a:t>
+              <a:t>Partition bits</a:t>
             </a:r>
           </a:p>
         </p:txBody>

</xml_diff>